<commit_message>
Updated the submission doc and presentation
</commit_message>
<xml_diff>
--- a/presentation/Kepler.pptx
+++ b/presentation/Kepler.pptx
@@ -115,7 +115,7 @@
   </p:defaultTextStyle>
   <p:extLst>
     <p:ext uri="{EFAFB233-063F-42B5-8137-9DF3F51BA10A}">
-      <p15:sldGuideLst xmlns:p15="http://schemas.microsoft.com/office/powerpoint/2012/main"/>
+      <p15:sldGuideLst xmlns:p15="http://schemas.microsoft.com/office/powerpoint/2012/main" xmlns=""/>
     </p:ext>
   </p:extLst>
 </p:presentation>
@@ -3141,6 +3141,13 @@
         </dgm:presLayoutVars>
       </dgm:prSet>
       <dgm:spPr/>
+      <dgm:t>
+        <a:bodyPr/>
+        <a:lstStyle/>
+        <a:p>
+          <a:endParaRPr lang="en-GB"/>
+        </a:p>
+      </dgm:t>
     </dgm:pt>
     <dgm:pt modelId="{50E1F76B-E30A-4DFB-BDA5-FE05736D942D}" type="pres">
       <dgm:prSet presAssocID="{B2BA5AA5-E4C8-46C6-86A7-8FDB75ADA769}" presName="node" presStyleLbl="node1" presStyleIdx="0" presStyleCnt="4">
@@ -3149,6 +3156,13 @@
         </dgm:presLayoutVars>
       </dgm:prSet>
       <dgm:spPr/>
+      <dgm:t>
+        <a:bodyPr/>
+        <a:lstStyle/>
+        <a:p>
+          <a:endParaRPr lang="en-GB"/>
+        </a:p>
+      </dgm:t>
     </dgm:pt>
     <dgm:pt modelId="{B00E5579-C390-4F6F-83A4-DC3A5BA1D638}" type="pres">
       <dgm:prSet presAssocID="{765F6DE7-AA46-40F3-921A-AC7560646B5A}" presName="sibTrans" presStyleCnt="0"/>
@@ -3161,6 +3175,13 @@
         </dgm:presLayoutVars>
       </dgm:prSet>
       <dgm:spPr/>
+      <dgm:t>
+        <a:bodyPr/>
+        <a:lstStyle/>
+        <a:p>
+          <a:endParaRPr lang="en-GB"/>
+        </a:p>
+      </dgm:t>
     </dgm:pt>
     <dgm:pt modelId="{C6C7764D-7A7A-443E-9F10-40F7C49D5F0A}" type="pres">
       <dgm:prSet presAssocID="{5EBDD160-3F16-494A-8D48-CFBF232FEB70}" presName="sibTrans" presStyleCnt="0"/>
@@ -3173,6 +3194,13 @@
         </dgm:presLayoutVars>
       </dgm:prSet>
       <dgm:spPr/>
+      <dgm:t>
+        <a:bodyPr/>
+        <a:lstStyle/>
+        <a:p>
+          <a:endParaRPr lang="en-GB"/>
+        </a:p>
+      </dgm:t>
     </dgm:pt>
     <dgm:pt modelId="{6EC72C29-4F23-4D71-863E-0CFAD1F15EEF}" type="pres">
       <dgm:prSet presAssocID="{90E57956-7BDF-4795-898F-E641DD3E4D44}" presName="sibTrans" presStyleCnt="0"/>
@@ -3185,6 +3213,13 @@
         </dgm:presLayoutVars>
       </dgm:prSet>
       <dgm:spPr/>
+      <dgm:t>
+        <a:bodyPr/>
+        <a:lstStyle/>
+        <a:p>
+          <a:endParaRPr lang="en-GB"/>
+        </a:p>
+      </dgm:t>
     </dgm:pt>
   </dgm:ptLst>
   <dgm:cxnLst>
@@ -3911,6 +3946,13 @@
         </dgm:presLayoutVars>
       </dgm:prSet>
       <dgm:spPr/>
+      <dgm:t>
+        <a:bodyPr/>
+        <a:lstStyle/>
+        <a:p>
+          <a:endParaRPr lang="en-GB"/>
+        </a:p>
+      </dgm:t>
     </dgm:pt>
     <dgm:pt modelId="{01284A1E-F536-4B5D-88A8-CBDBC739F037}" type="pres">
       <dgm:prSet presAssocID="{B70D2DD9-1895-4D57-AA6E-3C0612AEEA4A}" presName="linNode" presStyleCnt="0"/>
@@ -3924,6 +3966,13 @@
         </dgm:presLayoutVars>
       </dgm:prSet>
       <dgm:spPr/>
+      <dgm:t>
+        <a:bodyPr/>
+        <a:lstStyle/>
+        <a:p>
+          <a:endParaRPr lang="en-GB"/>
+        </a:p>
+      </dgm:t>
     </dgm:pt>
     <dgm:pt modelId="{DB833F3B-AD51-4576-A22F-30F7EDD83719}" type="pres">
       <dgm:prSet presAssocID="{B70D2DD9-1895-4D57-AA6E-3C0612AEEA4A}" presName="descendantText" presStyleLbl="alignAccFollowNode1" presStyleIdx="0" presStyleCnt="5">
@@ -3932,6 +3981,13 @@
         </dgm:presLayoutVars>
       </dgm:prSet>
       <dgm:spPr/>
+      <dgm:t>
+        <a:bodyPr/>
+        <a:lstStyle/>
+        <a:p>
+          <a:endParaRPr lang="en-GB"/>
+        </a:p>
+      </dgm:t>
     </dgm:pt>
     <dgm:pt modelId="{358A7068-6FCC-4C74-867E-0C5F71BE8399}" type="pres">
       <dgm:prSet presAssocID="{55A3A7DE-9C4E-41F5-A18E-1E98631E092F}" presName="sp" presStyleCnt="0"/>
@@ -3949,6 +4005,13 @@
         </dgm:presLayoutVars>
       </dgm:prSet>
       <dgm:spPr/>
+      <dgm:t>
+        <a:bodyPr/>
+        <a:lstStyle/>
+        <a:p>
+          <a:endParaRPr lang="en-GB"/>
+        </a:p>
+      </dgm:t>
     </dgm:pt>
     <dgm:pt modelId="{37143890-1B18-4E83-A8D8-2E79F91EC88F}" type="pres">
       <dgm:prSet presAssocID="{E1C67297-1CD3-4D24-A1A1-431C2F9D014C}" presName="descendantText" presStyleLbl="alignAccFollowNode1" presStyleIdx="1" presStyleCnt="5">
@@ -3957,6 +4020,13 @@
         </dgm:presLayoutVars>
       </dgm:prSet>
       <dgm:spPr/>
+      <dgm:t>
+        <a:bodyPr/>
+        <a:lstStyle/>
+        <a:p>
+          <a:endParaRPr lang="en-GB"/>
+        </a:p>
+      </dgm:t>
     </dgm:pt>
     <dgm:pt modelId="{49ADE37B-FC93-40A9-81BC-8C673CDC2640}" type="pres">
       <dgm:prSet presAssocID="{5E05C776-3BA7-4BC7-B74B-25B2CCDDD107}" presName="sp" presStyleCnt="0"/>
@@ -3974,6 +4044,13 @@
         </dgm:presLayoutVars>
       </dgm:prSet>
       <dgm:spPr/>
+      <dgm:t>
+        <a:bodyPr/>
+        <a:lstStyle/>
+        <a:p>
+          <a:endParaRPr lang="en-GB"/>
+        </a:p>
+      </dgm:t>
     </dgm:pt>
     <dgm:pt modelId="{4D3CABE8-8E1D-4B01-8A9A-9E6A3179EAF0}" type="pres">
       <dgm:prSet presAssocID="{19CD8B9A-2146-4581-9EF6-F137FE214CDD}" presName="descendantText" presStyleLbl="alignAccFollowNode1" presStyleIdx="2" presStyleCnt="5">
@@ -3982,6 +4059,13 @@
         </dgm:presLayoutVars>
       </dgm:prSet>
       <dgm:spPr/>
+      <dgm:t>
+        <a:bodyPr/>
+        <a:lstStyle/>
+        <a:p>
+          <a:endParaRPr lang="en-GB"/>
+        </a:p>
+      </dgm:t>
     </dgm:pt>
     <dgm:pt modelId="{A0D9CE28-B92A-4C1C-8DE9-36A1C27A6345}" type="pres">
       <dgm:prSet presAssocID="{479E4232-F2DA-49B2-BB05-B1057E11F4B9}" presName="sp" presStyleCnt="0"/>
@@ -3999,6 +4083,13 @@
         </dgm:presLayoutVars>
       </dgm:prSet>
       <dgm:spPr/>
+      <dgm:t>
+        <a:bodyPr/>
+        <a:lstStyle/>
+        <a:p>
+          <a:endParaRPr lang="en-GB"/>
+        </a:p>
+      </dgm:t>
     </dgm:pt>
     <dgm:pt modelId="{29B4C119-7922-4505-B68F-8CA0F9B2D1A8}" type="pres">
       <dgm:prSet presAssocID="{5F76C4F6-766D-4C8C-BA8D-A9A84ADA8CFA}" presName="descendantText" presStyleLbl="alignAccFollowNode1" presStyleIdx="3" presStyleCnt="5">
@@ -4007,6 +4098,13 @@
         </dgm:presLayoutVars>
       </dgm:prSet>
       <dgm:spPr/>
+      <dgm:t>
+        <a:bodyPr/>
+        <a:lstStyle/>
+        <a:p>
+          <a:endParaRPr lang="en-GB"/>
+        </a:p>
+      </dgm:t>
     </dgm:pt>
     <dgm:pt modelId="{469EB1AF-DC94-4E40-A89B-462716B236FF}" type="pres">
       <dgm:prSet presAssocID="{257EB0F2-1184-4A32-8DD5-16D451F39332}" presName="sp" presStyleCnt="0"/>
@@ -4024,6 +4122,13 @@
         </dgm:presLayoutVars>
       </dgm:prSet>
       <dgm:spPr/>
+      <dgm:t>
+        <a:bodyPr/>
+        <a:lstStyle/>
+        <a:p>
+          <a:endParaRPr lang="en-GB"/>
+        </a:p>
+      </dgm:t>
     </dgm:pt>
     <dgm:pt modelId="{1AF74E43-2C09-4698-B017-7B2C06C58F81}" type="pres">
       <dgm:prSet presAssocID="{484745D3-9FFF-4410-8CCF-E22EE580497A}" presName="descendantText" presStyleLbl="alignAccFollowNode1" presStyleIdx="4" presStyleCnt="5">
@@ -4032,6 +4137,13 @@
         </dgm:presLayoutVars>
       </dgm:prSet>
       <dgm:spPr/>
+      <dgm:t>
+        <a:bodyPr/>
+        <a:lstStyle/>
+        <a:p>
+          <a:endParaRPr lang="en-GB"/>
+        </a:p>
+      </dgm:t>
     </dgm:pt>
   </dgm:ptLst>
   <dgm:cxnLst>
@@ -4748,6 +4860,13 @@
         </dgm:presLayoutVars>
       </dgm:prSet>
       <dgm:spPr/>
+      <dgm:t>
+        <a:bodyPr/>
+        <a:lstStyle/>
+        <a:p>
+          <a:endParaRPr lang="en-GB"/>
+        </a:p>
+      </dgm:t>
     </dgm:pt>
     <dgm:pt modelId="{3D951C67-6A73-4DEA-9DD2-D7153CFDFDEE}" type="pres">
       <dgm:prSet presAssocID="{1C8E9815-AE6D-496D-A735-87CBA79964EA}" presName="linNode" presStyleCnt="0"/>
@@ -4761,6 +4880,13 @@
         </dgm:presLayoutVars>
       </dgm:prSet>
       <dgm:spPr/>
+      <dgm:t>
+        <a:bodyPr/>
+        <a:lstStyle/>
+        <a:p>
+          <a:endParaRPr lang="en-GB"/>
+        </a:p>
+      </dgm:t>
     </dgm:pt>
     <dgm:pt modelId="{3B6DE39D-AA0F-49E9-98F3-259607EB6E8A}" type="pres">
       <dgm:prSet presAssocID="{1C8E9815-AE6D-496D-A735-87CBA79964EA}" presName="bracket" presStyleLbl="parChTrans1D1" presStyleIdx="0" presStyleCnt="5"/>
@@ -4777,6 +4903,13 @@
         </dgm:presLayoutVars>
       </dgm:prSet>
       <dgm:spPr/>
+      <dgm:t>
+        <a:bodyPr/>
+        <a:lstStyle/>
+        <a:p>
+          <a:endParaRPr lang="en-GB"/>
+        </a:p>
+      </dgm:t>
     </dgm:pt>
     <dgm:pt modelId="{C67547A3-AED1-4D27-B430-CF621B56343F}" type="pres">
       <dgm:prSet presAssocID="{43B88CF8-B095-4A9C-8A37-279ACBC7ED3E}" presName="spV" presStyleCnt="0"/>
@@ -4794,6 +4927,13 @@
         </dgm:presLayoutVars>
       </dgm:prSet>
       <dgm:spPr/>
+      <dgm:t>
+        <a:bodyPr/>
+        <a:lstStyle/>
+        <a:p>
+          <a:endParaRPr lang="en-GB"/>
+        </a:p>
+      </dgm:t>
     </dgm:pt>
     <dgm:pt modelId="{942AAD63-E67C-4A18-81D9-A468408DB75E}" type="pres">
       <dgm:prSet presAssocID="{91D0EB76-F6A9-4BEE-9D16-8DA43E52546D}" presName="bracket" presStyleLbl="parChTrans1D1" presStyleIdx="1" presStyleCnt="5"/>
@@ -4810,6 +4950,13 @@
         </dgm:presLayoutVars>
       </dgm:prSet>
       <dgm:spPr/>
+      <dgm:t>
+        <a:bodyPr/>
+        <a:lstStyle/>
+        <a:p>
+          <a:endParaRPr lang="en-GB"/>
+        </a:p>
+      </dgm:t>
     </dgm:pt>
     <dgm:pt modelId="{915B3D77-6B9A-4439-B19F-76C819AA523F}" type="pres">
       <dgm:prSet presAssocID="{A92C918E-D55A-455B-B912-45E99CE43753}" presName="spV" presStyleCnt="0"/>
@@ -4827,6 +4974,13 @@
         </dgm:presLayoutVars>
       </dgm:prSet>
       <dgm:spPr/>
+      <dgm:t>
+        <a:bodyPr/>
+        <a:lstStyle/>
+        <a:p>
+          <a:endParaRPr lang="en-GB"/>
+        </a:p>
+      </dgm:t>
     </dgm:pt>
     <dgm:pt modelId="{0D533747-B980-498A-9E09-179A06E92DCE}" type="pres">
       <dgm:prSet presAssocID="{E61B1C18-0BF1-4FB5-AE84-A8D20D8BB814}" presName="bracket" presStyleLbl="parChTrans1D1" presStyleIdx="2" presStyleCnt="5"/>
@@ -4843,6 +4997,13 @@
         </dgm:presLayoutVars>
       </dgm:prSet>
       <dgm:spPr/>
+      <dgm:t>
+        <a:bodyPr/>
+        <a:lstStyle/>
+        <a:p>
+          <a:endParaRPr lang="en-GB"/>
+        </a:p>
+      </dgm:t>
     </dgm:pt>
     <dgm:pt modelId="{D1607EA0-29E4-43C4-97A2-34B7531F5670}" type="pres">
       <dgm:prSet presAssocID="{98A03895-C1BB-4195-864A-5486CCC34EE7}" presName="spV" presStyleCnt="0"/>
@@ -4860,6 +5021,13 @@
         </dgm:presLayoutVars>
       </dgm:prSet>
       <dgm:spPr/>
+      <dgm:t>
+        <a:bodyPr/>
+        <a:lstStyle/>
+        <a:p>
+          <a:endParaRPr lang="en-GB"/>
+        </a:p>
+      </dgm:t>
     </dgm:pt>
     <dgm:pt modelId="{69D7D4D9-5754-4AFB-8F8A-90ECCD7A82A9}" type="pres">
       <dgm:prSet presAssocID="{C06AC3F6-9C8A-4537-8716-7D1E01D69A22}" presName="bracket" presStyleLbl="parChTrans1D1" presStyleIdx="3" presStyleCnt="5"/>
@@ -4876,6 +5044,13 @@
         </dgm:presLayoutVars>
       </dgm:prSet>
       <dgm:spPr/>
+      <dgm:t>
+        <a:bodyPr/>
+        <a:lstStyle/>
+        <a:p>
+          <a:endParaRPr lang="en-GB"/>
+        </a:p>
+      </dgm:t>
     </dgm:pt>
     <dgm:pt modelId="{8496564C-5B9F-4083-9B80-FB960E38B6AA}" type="pres">
       <dgm:prSet presAssocID="{1E7AD02D-7A32-41FD-A49C-79587D51E495}" presName="spV" presStyleCnt="0"/>
@@ -4893,6 +5068,13 @@
         </dgm:presLayoutVars>
       </dgm:prSet>
       <dgm:spPr/>
+      <dgm:t>
+        <a:bodyPr/>
+        <a:lstStyle/>
+        <a:p>
+          <a:endParaRPr lang="en-GB"/>
+        </a:p>
+      </dgm:t>
     </dgm:pt>
     <dgm:pt modelId="{9DB501DE-5406-4B33-9E66-BDFF96B2FEA1}" type="pres">
       <dgm:prSet presAssocID="{01CD7B7E-2963-42DD-830A-40869D9DC10D}" presName="bracket" presStyleLbl="parChTrans1D1" presStyleIdx="4" presStyleCnt="5"/>
@@ -4909,40 +5091,47 @@
         </dgm:presLayoutVars>
       </dgm:prSet>
       <dgm:spPr/>
+      <dgm:t>
+        <a:bodyPr/>
+        <a:lstStyle/>
+        <a:p>
+          <a:endParaRPr lang="en-GB"/>
+        </a:p>
+      </dgm:t>
     </dgm:pt>
   </dgm:ptLst>
   <dgm:cxnLst>
+    <dgm:cxn modelId="{DAED6FE8-B416-4C64-8C3B-62298C8EA27E}" srcId="{C06AC3F6-9C8A-4537-8716-7D1E01D69A22}" destId="{0C527BBD-610B-4C85-B280-A6F0A00C7A05}" srcOrd="0" destOrd="0" parTransId="{1DA166E0-C3CD-481F-94D4-B98DA71C1246}" sibTransId="{FC3358AD-C4AD-4658-BA01-C6A9A0CF77FB}"/>
+    <dgm:cxn modelId="{D7E39239-E9FB-4813-AF2B-47CABCB28E8B}" srcId="{C06AC3F6-9C8A-4537-8716-7D1E01D69A22}" destId="{BD5C6C27-4E10-4A10-BAFC-DB6FA94311C9}" srcOrd="1" destOrd="0" parTransId="{E11D6736-FCD7-4FCE-B5EA-CCACEAB3FCBD}" sibTransId="{A4CF830A-0EC8-40F4-9824-53E8EA5CB210}"/>
+    <dgm:cxn modelId="{53A7DF4F-2423-4D32-B0D8-4BAA83D495CB}" type="presOf" srcId="{BD5C6C27-4E10-4A10-BAFC-DB6FA94311C9}" destId="{427277C7-FC4F-4231-9C3F-920C3815A9E5}" srcOrd="0" destOrd="1" presId="urn:diagrams.loki3.com/BracketList"/>
+    <dgm:cxn modelId="{7EF461A3-B6F8-4F6B-97C8-92E09B57DE53}" type="presOf" srcId="{164E8698-AFAF-4CB2-B4F3-998C20BC454A}" destId="{398CB2CD-779C-49F2-8BFB-080731C053C4}" srcOrd="0" destOrd="1" presId="urn:diagrams.loki3.com/BracketList"/>
+    <dgm:cxn modelId="{28B56941-8F31-4021-B7DC-9157A97CAB48}" srcId="{91D0EB76-F6A9-4BEE-9D16-8DA43E52546D}" destId="{CB3DF28C-448D-4C63-9418-3265BDDDC3E1}" srcOrd="0" destOrd="0" parTransId="{EF261564-70E3-4D7D-BAD0-0E38770BC784}" sibTransId="{16A16E68-8BAF-48BA-8EF9-0ACC92334016}"/>
+    <dgm:cxn modelId="{8B9D6DA6-88A4-46E3-B80F-67F87100962C}" srcId="{C971C89A-9A94-4551-B102-2C432965F17D}" destId="{01CD7B7E-2963-42DD-830A-40869D9DC10D}" srcOrd="4" destOrd="0" parTransId="{728C3420-F075-49C5-9C10-56A81EC5A2DA}" sibTransId="{D9D951CE-8F4B-45EB-AAC7-F2007504AB0E}"/>
     <dgm:cxn modelId="{DE528766-77B6-4C98-9EFD-CF2557B2D25E}" type="presOf" srcId="{C971C89A-9A94-4551-B102-2C432965F17D}" destId="{266E1F04-00A6-4F70-82C2-6885CB3891F7}" srcOrd="0" destOrd="0" presId="urn:diagrams.loki3.com/BracketList"/>
-    <dgm:cxn modelId="{53A7DF4F-2423-4D32-B0D8-4BAA83D495CB}" type="presOf" srcId="{BD5C6C27-4E10-4A10-BAFC-DB6FA94311C9}" destId="{427277C7-FC4F-4231-9C3F-920C3815A9E5}" srcOrd="0" destOrd="1" presId="urn:diagrams.loki3.com/BracketList"/>
+    <dgm:cxn modelId="{49BF8DBC-311C-4FE8-BBC2-D02B4C2EF236}" type="presOf" srcId="{1C8E9815-AE6D-496D-A735-87CBA79964EA}" destId="{F81F2571-3068-41FC-9522-0E7D25B49BBE}" srcOrd="0" destOrd="0" presId="urn:diagrams.loki3.com/BracketList"/>
+    <dgm:cxn modelId="{D7B3C4F9-4711-465D-BA3B-6205468BCBF6}" type="presOf" srcId="{E61B1C18-0BF1-4FB5-AE84-A8D20D8BB814}" destId="{D5568032-CC70-4A3C-83E4-B27849DED8D4}" srcOrd="0" destOrd="0" presId="urn:diagrams.loki3.com/BracketList"/>
+    <dgm:cxn modelId="{FFE7F458-A350-49FE-8616-0FAAE89D669C}" srcId="{01CD7B7E-2963-42DD-830A-40869D9DC10D}" destId="{0FF9AD06-06E8-47A0-A8CC-3EF3B3FDAFD2}" srcOrd="0" destOrd="0" parTransId="{79E0C327-A854-4DC8-96D3-56754D16A66F}" sibTransId="{1815DD62-97B8-40EF-AF59-D54F015E28A6}"/>
+    <dgm:cxn modelId="{FED6E513-1A96-4942-A65D-9B979C8CE41B}" srcId="{1C8E9815-AE6D-496D-A735-87CBA79964EA}" destId="{E345950A-B289-46B9-AE71-F4FD36752FD9}" srcOrd="1" destOrd="0" parTransId="{8EFD0B75-AD06-42B0-8D35-A60D79FC3BF7}" sibTransId="{8932E850-9A68-4570-B3E8-5822C7EFB70D}"/>
+    <dgm:cxn modelId="{E976EA01-693D-4291-8FB1-9F80923F866E}" type="presOf" srcId="{01CD7B7E-2963-42DD-830A-40869D9DC10D}" destId="{A9DDCD47-19B7-449F-8E6F-04A01F49980F}" srcOrd="0" destOrd="0" presId="urn:diagrams.loki3.com/BracketList"/>
+    <dgm:cxn modelId="{B933AAA6-4EA3-4B91-84B9-1AFAD70EC433}" srcId="{C971C89A-9A94-4551-B102-2C432965F17D}" destId="{1C8E9815-AE6D-496D-A735-87CBA79964EA}" srcOrd="0" destOrd="0" parTransId="{2B6CDF61-E902-4664-9F91-3305D63716E1}" sibTransId="{43B88CF8-B095-4A9C-8A37-279ACBC7ED3E}"/>
+    <dgm:cxn modelId="{CB2028BF-DA15-48AE-B400-7B0F43D50C81}" type="presOf" srcId="{CB3DF28C-448D-4C63-9418-3265BDDDC3E1}" destId="{B27D6E9B-39F6-404E-948D-C2CE04A7CAC1}" srcOrd="0" destOrd="0" presId="urn:diagrams.loki3.com/BracketList"/>
+    <dgm:cxn modelId="{EC32E268-B68C-429E-8164-FCADB9EADC5B}" srcId="{E61B1C18-0BF1-4FB5-AE84-A8D20D8BB814}" destId="{5CEA56EB-9454-4960-A990-EEF1533B300E}" srcOrd="0" destOrd="0" parTransId="{C2D1F64C-06B2-4804-BC75-DA5EB95D68EB}" sibTransId="{2D1C0280-F6B5-42F2-9343-2C16CF5DCAC2}"/>
+    <dgm:cxn modelId="{CAF582BC-D00C-4E5B-8618-DC5F1F7031E7}" srcId="{91D0EB76-F6A9-4BEE-9D16-8DA43E52546D}" destId="{9AD3CE5F-F11B-465C-A987-72C34871B54E}" srcOrd="1" destOrd="0" parTransId="{804E7FB5-C401-4418-BD63-DE1136CAC019}" sibTransId="{92FB8E84-AABD-4F83-AECE-E0CA5271C755}"/>
+    <dgm:cxn modelId="{9F4E86EB-E503-495A-8570-D3EB4BFF2EB3}" srcId="{C971C89A-9A94-4551-B102-2C432965F17D}" destId="{E61B1C18-0BF1-4FB5-AE84-A8D20D8BB814}" srcOrd="2" destOrd="0" parTransId="{0610FD21-E0ED-44BD-9308-C58FA25C3D1C}" sibTransId="{98A03895-C1BB-4195-864A-5486CCC34EE7}"/>
+    <dgm:cxn modelId="{DC6C456A-EC3A-469E-A292-A2023706545E}" type="presOf" srcId="{E345950A-B289-46B9-AE71-F4FD36752FD9}" destId="{02457115-F5E5-4F1A-BBCC-CDB7F5A10EC8}" srcOrd="0" destOrd="1" presId="urn:diagrams.loki3.com/BracketList"/>
+    <dgm:cxn modelId="{28C48724-9D0D-4163-AD36-EC7D92688DE6}" type="presOf" srcId="{AE3C2586-E145-40B9-A992-EAED99AEC4D6}" destId="{02457115-F5E5-4F1A-BBCC-CDB7F5A10EC8}" srcOrd="0" destOrd="0" presId="urn:diagrams.loki3.com/BracketList"/>
+    <dgm:cxn modelId="{D968835E-D4CA-421C-B246-1FBDABDE5F40}" srcId="{E61B1C18-0BF1-4FB5-AE84-A8D20D8BB814}" destId="{164E8698-AFAF-4CB2-B4F3-998C20BC454A}" srcOrd="1" destOrd="0" parTransId="{904320E9-9D4F-423E-BAC0-C2D12F01B24A}" sibTransId="{3400E59D-175C-40F7-B62D-25347A2DA855}"/>
+    <dgm:cxn modelId="{BBB78E14-4CAF-4AFA-B9F3-69B3DF38A133}" srcId="{C971C89A-9A94-4551-B102-2C432965F17D}" destId="{91D0EB76-F6A9-4BEE-9D16-8DA43E52546D}" srcOrd="1" destOrd="0" parTransId="{6286C36D-FC46-4524-9067-AAE5F84B8635}" sibTransId="{A92C918E-D55A-455B-B912-45E99CE43753}"/>
+    <dgm:cxn modelId="{ED749A21-A90F-48E6-8E0C-DF8719A99EA9}" type="presOf" srcId="{5CEA56EB-9454-4960-A990-EEF1533B300E}" destId="{398CB2CD-779C-49F2-8BFB-080731C053C4}" srcOrd="0" destOrd="0" presId="urn:diagrams.loki3.com/BracketList"/>
+    <dgm:cxn modelId="{8241C7D5-07FA-4C53-8075-D6E625712363}" type="presOf" srcId="{0C527BBD-610B-4C85-B280-A6F0A00C7A05}" destId="{427277C7-FC4F-4231-9C3F-920C3815A9E5}" srcOrd="0" destOrd="0" presId="urn:diagrams.loki3.com/BracketList"/>
+    <dgm:cxn modelId="{9207E6B2-EE00-481D-AC6F-80F1D5831275}" srcId="{01CD7B7E-2963-42DD-830A-40869D9DC10D}" destId="{D3EA8E8C-7AA2-44C3-827B-1021A79F427E}" srcOrd="1" destOrd="0" parTransId="{B1FAE5BF-6995-4641-85B2-9BB59C934C8A}" sibTransId="{7A5D70D5-B7D0-40A8-B427-07D00EE0BBDA}"/>
     <dgm:cxn modelId="{2C4C9DC7-F204-4C99-828A-989C202C330E}" type="presOf" srcId="{9AD3CE5F-F11B-465C-A987-72C34871B54E}" destId="{B27D6E9B-39F6-404E-948D-C2CE04A7CAC1}" srcOrd="0" destOrd="1" presId="urn:diagrams.loki3.com/BracketList"/>
-    <dgm:cxn modelId="{E976EA01-693D-4291-8FB1-9F80923F866E}" type="presOf" srcId="{01CD7B7E-2963-42DD-830A-40869D9DC10D}" destId="{A9DDCD47-19B7-449F-8E6F-04A01F49980F}" srcOrd="0" destOrd="0" presId="urn:diagrams.loki3.com/BracketList"/>
-    <dgm:cxn modelId="{FFE7F458-A350-49FE-8616-0FAAE89D669C}" srcId="{01CD7B7E-2963-42DD-830A-40869D9DC10D}" destId="{0FF9AD06-06E8-47A0-A8CC-3EF3B3FDAFD2}" srcOrd="0" destOrd="0" parTransId="{79E0C327-A854-4DC8-96D3-56754D16A66F}" sibTransId="{1815DD62-97B8-40EF-AF59-D54F015E28A6}"/>
-    <dgm:cxn modelId="{CB2028BF-DA15-48AE-B400-7B0F43D50C81}" type="presOf" srcId="{CB3DF28C-448D-4C63-9418-3265BDDDC3E1}" destId="{B27D6E9B-39F6-404E-948D-C2CE04A7CAC1}" srcOrd="0" destOrd="0" presId="urn:diagrams.loki3.com/BracketList"/>
-    <dgm:cxn modelId="{28C48724-9D0D-4163-AD36-EC7D92688DE6}" type="presOf" srcId="{AE3C2586-E145-40B9-A992-EAED99AEC4D6}" destId="{02457115-F5E5-4F1A-BBCC-CDB7F5A10EC8}" srcOrd="0" destOrd="0" presId="urn:diagrams.loki3.com/BracketList"/>
-    <dgm:cxn modelId="{ED749A21-A90F-48E6-8E0C-DF8719A99EA9}" type="presOf" srcId="{5CEA56EB-9454-4960-A990-EEF1533B300E}" destId="{398CB2CD-779C-49F2-8BFB-080731C053C4}" srcOrd="0" destOrd="0" presId="urn:diagrams.loki3.com/BracketList"/>
-    <dgm:cxn modelId="{EC32E268-B68C-429E-8164-FCADB9EADC5B}" srcId="{E61B1C18-0BF1-4FB5-AE84-A8D20D8BB814}" destId="{5CEA56EB-9454-4960-A990-EEF1533B300E}" srcOrd="0" destOrd="0" parTransId="{C2D1F64C-06B2-4804-BC75-DA5EB95D68EB}" sibTransId="{2D1C0280-F6B5-42F2-9343-2C16CF5DCAC2}"/>
-    <dgm:cxn modelId="{7EF461A3-B6F8-4F6B-97C8-92E09B57DE53}" type="presOf" srcId="{164E8698-AFAF-4CB2-B4F3-998C20BC454A}" destId="{398CB2CD-779C-49F2-8BFB-080731C053C4}" srcOrd="0" destOrd="1" presId="urn:diagrams.loki3.com/BracketList"/>
-    <dgm:cxn modelId="{D968835E-D4CA-421C-B246-1FBDABDE5F40}" srcId="{E61B1C18-0BF1-4FB5-AE84-A8D20D8BB814}" destId="{164E8698-AFAF-4CB2-B4F3-998C20BC454A}" srcOrd="1" destOrd="0" parTransId="{904320E9-9D4F-423E-BAC0-C2D12F01B24A}" sibTransId="{3400E59D-175C-40F7-B62D-25347A2DA855}"/>
-    <dgm:cxn modelId="{9207E6B2-EE00-481D-AC6F-80F1D5831275}" srcId="{01CD7B7E-2963-42DD-830A-40869D9DC10D}" destId="{D3EA8E8C-7AA2-44C3-827B-1021A79F427E}" srcOrd="1" destOrd="0" parTransId="{B1FAE5BF-6995-4641-85B2-9BB59C934C8A}" sibTransId="{7A5D70D5-B7D0-40A8-B427-07D00EE0BBDA}"/>
+    <dgm:cxn modelId="{E7D6EF1B-D7B0-46E6-B7BE-1373B8F8CE7C}" type="presOf" srcId="{0FF9AD06-06E8-47A0-A8CC-3EF3B3FDAFD2}" destId="{21498668-43E3-41E3-8FF6-C2B71F9AE46B}" srcOrd="0" destOrd="0" presId="urn:diagrams.loki3.com/BracketList"/>
+    <dgm:cxn modelId="{0879D504-44E8-40AD-AAB0-E707306A1F69}" type="presOf" srcId="{C06AC3F6-9C8A-4537-8716-7D1E01D69A22}" destId="{586EB7D3-FDA4-473A-9871-AA960A7336FD}" srcOrd="0" destOrd="0" presId="urn:diagrams.loki3.com/BracketList"/>
     <dgm:cxn modelId="{FEA4FD7B-9DBD-4824-AC5A-4860C082D3F6}" type="presOf" srcId="{91D0EB76-F6A9-4BEE-9D16-8DA43E52546D}" destId="{3A077590-EFBB-40E2-B1A8-C4C700B019BE}" srcOrd="0" destOrd="0" presId="urn:diagrams.loki3.com/BracketList"/>
-    <dgm:cxn modelId="{D7B3C4F9-4711-465D-BA3B-6205468BCBF6}" type="presOf" srcId="{E61B1C18-0BF1-4FB5-AE84-A8D20D8BB814}" destId="{D5568032-CC70-4A3C-83E4-B27849DED8D4}" srcOrd="0" destOrd="0" presId="urn:diagrams.loki3.com/BracketList"/>
-    <dgm:cxn modelId="{D7E39239-E9FB-4813-AF2B-47CABCB28E8B}" srcId="{C06AC3F6-9C8A-4537-8716-7D1E01D69A22}" destId="{BD5C6C27-4E10-4A10-BAFC-DB6FA94311C9}" srcOrd="1" destOrd="0" parTransId="{E11D6736-FCD7-4FCE-B5EA-CCACEAB3FCBD}" sibTransId="{A4CF830A-0EC8-40F4-9824-53E8EA5CB210}"/>
+    <dgm:cxn modelId="{0C0C895C-C7E4-4C74-B949-254A9ABAC2AF}" srcId="{C971C89A-9A94-4551-B102-2C432965F17D}" destId="{C06AC3F6-9C8A-4537-8716-7D1E01D69A22}" srcOrd="3" destOrd="0" parTransId="{3AB7139D-662E-4855-ACC5-260395550E37}" sibTransId="{1E7AD02D-7A32-41FD-A49C-79587D51E495}"/>
+    <dgm:cxn modelId="{5043171C-500F-43B2-9056-B2A2B61290EB}" type="presOf" srcId="{D3EA8E8C-7AA2-44C3-827B-1021A79F427E}" destId="{21498668-43E3-41E3-8FF6-C2B71F9AE46B}" srcOrd="0" destOrd="1" presId="urn:diagrams.loki3.com/BracketList"/>
     <dgm:cxn modelId="{21408CD6-0B0A-41F3-B6A3-AFC2F14EA227}" srcId="{1C8E9815-AE6D-496D-A735-87CBA79964EA}" destId="{AE3C2586-E145-40B9-A992-EAED99AEC4D6}" srcOrd="0" destOrd="0" parTransId="{6BA9DE15-F13C-4A36-8C0A-03796FEDF8D9}" sibTransId="{E8BE0BCD-AE07-4AD9-9699-76C01CC669D7}"/>
-    <dgm:cxn modelId="{8241C7D5-07FA-4C53-8075-D6E625712363}" type="presOf" srcId="{0C527BBD-610B-4C85-B280-A6F0A00C7A05}" destId="{427277C7-FC4F-4231-9C3F-920C3815A9E5}" srcOrd="0" destOrd="0" presId="urn:diagrams.loki3.com/BracketList"/>
-    <dgm:cxn modelId="{FED6E513-1A96-4942-A65D-9B979C8CE41B}" srcId="{1C8E9815-AE6D-496D-A735-87CBA79964EA}" destId="{E345950A-B289-46B9-AE71-F4FD36752FD9}" srcOrd="1" destOrd="0" parTransId="{8EFD0B75-AD06-42B0-8D35-A60D79FC3BF7}" sibTransId="{8932E850-9A68-4570-B3E8-5822C7EFB70D}"/>
-    <dgm:cxn modelId="{5043171C-500F-43B2-9056-B2A2B61290EB}" type="presOf" srcId="{D3EA8E8C-7AA2-44C3-827B-1021A79F427E}" destId="{21498668-43E3-41E3-8FF6-C2B71F9AE46B}" srcOrd="0" destOrd="1" presId="urn:diagrams.loki3.com/BracketList"/>
-    <dgm:cxn modelId="{8B9D6DA6-88A4-46E3-B80F-67F87100962C}" srcId="{C971C89A-9A94-4551-B102-2C432965F17D}" destId="{01CD7B7E-2963-42DD-830A-40869D9DC10D}" srcOrd="4" destOrd="0" parTransId="{728C3420-F075-49C5-9C10-56A81EC5A2DA}" sibTransId="{D9D951CE-8F4B-45EB-AAC7-F2007504AB0E}"/>
-    <dgm:cxn modelId="{DC6C456A-EC3A-469E-A292-A2023706545E}" type="presOf" srcId="{E345950A-B289-46B9-AE71-F4FD36752FD9}" destId="{02457115-F5E5-4F1A-BBCC-CDB7F5A10EC8}" srcOrd="0" destOrd="1" presId="urn:diagrams.loki3.com/BracketList"/>
-    <dgm:cxn modelId="{B933AAA6-4EA3-4B91-84B9-1AFAD70EC433}" srcId="{C971C89A-9A94-4551-B102-2C432965F17D}" destId="{1C8E9815-AE6D-496D-A735-87CBA79964EA}" srcOrd="0" destOrd="0" parTransId="{2B6CDF61-E902-4664-9F91-3305D63716E1}" sibTransId="{43B88CF8-B095-4A9C-8A37-279ACBC7ED3E}"/>
-    <dgm:cxn modelId="{0C0C895C-C7E4-4C74-B949-254A9ABAC2AF}" srcId="{C971C89A-9A94-4551-B102-2C432965F17D}" destId="{C06AC3F6-9C8A-4537-8716-7D1E01D69A22}" srcOrd="3" destOrd="0" parTransId="{3AB7139D-662E-4855-ACC5-260395550E37}" sibTransId="{1E7AD02D-7A32-41FD-A49C-79587D51E495}"/>
-    <dgm:cxn modelId="{DAED6FE8-B416-4C64-8C3B-62298C8EA27E}" srcId="{C06AC3F6-9C8A-4537-8716-7D1E01D69A22}" destId="{0C527BBD-610B-4C85-B280-A6F0A00C7A05}" srcOrd="0" destOrd="0" parTransId="{1DA166E0-C3CD-481F-94D4-B98DA71C1246}" sibTransId="{FC3358AD-C4AD-4658-BA01-C6A9A0CF77FB}"/>
-    <dgm:cxn modelId="{9F4E86EB-E503-495A-8570-D3EB4BFF2EB3}" srcId="{C971C89A-9A94-4551-B102-2C432965F17D}" destId="{E61B1C18-0BF1-4FB5-AE84-A8D20D8BB814}" srcOrd="2" destOrd="0" parTransId="{0610FD21-E0ED-44BD-9308-C58FA25C3D1C}" sibTransId="{98A03895-C1BB-4195-864A-5486CCC34EE7}"/>
-    <dgm:cxn modelId="{0879D504-44E8-40AD-AAB0-E707306A1F69}" type="presOf" srcId="{C06AC3F6-9C8A-4537-8716-7D1E01D69A22}" destId="{586EB7D3-FDA4-473A-9871-AA960A7336FD}" srcOrd="0" destOrd="0" presId="urn:diagrams.loki3.com/BracketList"/>
-    <dgm:cxn modelId="{49BF8DBC-311C-4FE8-BBC2-D02B4C2EF236}" type="presOf" srcId="{1C8E9815-AE6D-496D-A735-87CBA79964EA}" destId="{F81F2571-3068-41FC-9522-0E7D25B49BBE}" srcOrd="0" destOrd="0" presId="urn:diagrams.loki3.com/BracketList"/>
-    <dgm:cxn modelId="{CAF582BC-D00C-4E5B-8618-DC5F1F7031E7}" srcId="{91D0EB76-F6A9-4BEE-9D16-8DA43E52546D}" destId="{9AD3CE5F-F11B-465C-A987-72C34871B54E}" srcOrd="1" destOrd="0" parTransId="{804E7FB5-C401-4418-BD63-DE1136CAC019}" sibTransId="{92FB8E84-AABD-4F83-AECE-E0CA5271C755}"/>
-    <dgm:cxn modelId="{BBB78E14-4CAF-4AFA-B9F3-69B3DF38A133}" srcId="{C971C89A-9A94-4551-B102-2C432965F17D}" destId="{91D0EB76-F6A9-4BEE-9D16-8DA43E52546D}" srcOrd="1" destOrd="0" parTransId="{6286C36D-FC46-4524-9067-AAE5F84B8635}" sibTransId="{A92C918E-D55A-455B-B912-45E99CE43753}"/>
-    <dgm:cxn modelId="{28B56941-8F31-4021-B7DC-9157A97CAB48}" srcId="{91D0EB76-F6A9-4BEE-9D16-8DA43E52546D}" destId="{CB3DF28C-448D-4C63-9418-3265BDDDC3E1}" srcOrd="0" destOrd="0" parTransId="{EF261564-70E3-4D7D-BAD0-0E38770BC784}" sibTransId="{16A16E68-8BAF-48BA-8EF9-0ACC92334016}"/>
-    <dgm:cxn modelId="{E7D6EF1B-D7B0-46E6-B7BE-1373B8F8CE7C}" type="presOf" srcId="{0FF9AD06-06E8-47A0-A8CC-3EF3B3FDAFD2}" destId="{21498668-43E3-41E3-8FF6-C2B71F9AE46B}" srcOrd="0" destOrd="0" presId="urn:diagrams.loki3.com/BracketList"/>
     <dgm:cxn modelId="{33386158-F8B4-4596-A73F-6AEE1EFEB5BC}" type="presParOf" srcId="{266E1F04-00A6-4F70-82C2-6885CB3891F7}" destId="{3D951C67-6A73-4DEA-9DD2-D7153CFDFDEE}" srcOrd="0" destOrd="0" presId="urn:diagrams.loki3.com/BracketList"/>
     <dgm:cxn modelId="{87ECFC54-C11E-4F27-A7A5-CC427F325A21}" type="presParOf" srcId="{3D951C67-6A73-4DEA-9DD2-D7153CFDFDEE}" destId="{F81F2571-3068-41FC-9522-0E7D25B49BBE}" srcOrd="0" destOrd="0" presId="urn:diagrams.loki3.com/BracketList"/>
     <dgm:cxn modelId="{DDB6115A-867F-4751-839D-0C6F4AC7A277}" type="presParOf" srcId="{3D951C67-6A73-4DEA-9DD2-D7153CFDFDEE}" destId="{3B6DE39D-AA0F-49E9-98F3-259607EB6E8A}" srcOrd="1" destOrd="0" presId="urn:diagrams.loki3.com/BracketList"/>
@@ -5068,7 +5257,7 @@
         </a:bodyPr>
         <a:lstStyle/>
         <a:p>
-          <a:pPr marL="0" lvl="0" indent="0" algn="l" defTabSz="1333500">
+          <a:pPr lvl="0" algn="l" defTabSz="1333500">
             <a:lnSpc>
               <a:spcPct val="90000"/>
             </a:lnSpc>
@@ -5078,7 +5267,6 @@
             <a:spcAft>
               <a:spcPct val="35000"/>
             </a:spcAft>
-            <a:buNone/>
           </a:pPr>
           <a:r>
             <a:rPr lang="en-US" sz="3000" b="0" kern="1200" dirty="0">
@@ -5100,7 +5288,7 @@
             <a:spcAft>
               <a:spcPct val="15000"/>
             </a:spcAft>
-            <a:buChar char="•"/>
+            <a:buChar char="••"/>
           </a:pPr>
           <a:r>
             <a:rPr lang="en-US" sz="2300" kern="1200" dirty="0" err="1">
@@ -5127,7 +5315,7 @@
             <a:spcAft>
               <a:spcPct val="15000"/>
             </a:spcAft>
-            <a:buChar char="•"/>
+            <a:buChar char="••"/>
           </a:pPr>
           <a:r>
             <a:rPr lang="en-US" sz="2300" kern="1200" dirty="0">
@@ -5149,7 +5337,7 @@
             <a:spcAft>
               <a:spcPct val="15000"/>
             </a:spcAft>
-            <a:buChar char="•"/>
+            <a:buChar char="••"/>
           </a:pPr>
           <a:r>
             <a:rPr lang="en-US" sz="2300" kern="1200" dirty="0">
@@ -5183,7 +5371,7 @@
           <a:gsLst>
             <a:gs pos="0">
               <a:schemeClr val="accent5">
-                <a:hueOff val="2003568"/>
+                <a:hueOff val="2003566"/>
                 <a:satOff val="-8793"/>
                 <a:lumOff val="2614"/>
                 <a:alphaOff val="0"/>
@@ -5193,7 +5381,7 @@
             </a:gs>
             <a:gs pos="78000">
               <a:schemeClr val="accent5">
-                <a:hueOff val="2003568"/>
+                <a:hueOff val="2003566"/>
                 <a:satOff val="-8793"/>
                 <a:lumOff val="2614"/>
                 <a:alphaOff val="0"/>
@@ -5243,7 +5431,7 @@
         </a:bodyPr>
         <a:lstStyle/>
         <a:p>
-          <a:pPr marL="0" lvl="0" indent="0" algn="l" defTabSz="1333500">
+          <a:pPr lvl="0" algn="l" defTabSz="1333500">
             <a:lnSpc>
               <a:spcPct val="90000"/>
             </a:lnSpc>
@@ -5253,7 +5441,6 @@
             <a:spcAft>
               <a:spcPct val="35000"/>
             </a:spcAft>
-            <a:buNone/>
           </a:pPr>
           <a:r>
             <a:rPr lang="en-US" sz="3000" kern="1200" dirty="0">
@@ -5275,7 +5462,7 @@
             <a:spcAft>
               <a:spcPct val="15000"/>
             </a:spcAft>
-            <a:buChar char="•"/>
+            <a:buChar char="••"/>
           </a:pPr>
           <a:r>
             <a:rPr lang="en-US" sz="2300" kern="1200" dirty="0">
@@ -5297,7 +5484,7 @@
             <a:spcAft>
               <a:spcPct val="15000"/>
             </a:spcAft>
-            <a:buChar char="•"/>
+            <a:buChar char="••"/>
           </a:pPr>
           <a:r>
             <a:rPr lang="en-US" sz="2300" kern="1200" dirty="0">
@@ -5331,7 +5518,7 @@
           <a:gsLst>
             <a:gs pos="0">
               <a:schemeClr val="accent5">
-                <a:hueOff val="4007135"/>
+                <a:hueOff val="4007133"/>
                 <a:satOff val="-17587"/>
                 <a:lumOff val="5229"/>
                 <a:alphaOff val="0"/>
@@ -5341,7 +5528,7 @@
             </a:gs>
             <a:gs pos="78000">
               <a:schemeClr val="accent5">
-                <a:hueOff val="4007135"/>
+                <a:hueOff val="4007133"/>
                 <a:satOff val="-17587"/>
                 <a:lumOff val="5229"/>
                 <a:alphaOff val="0"/>
@@ -5391,7 +5578,7 @@
         </a:bodyPr>
         <a:lstStyle/>
         <a:p>
-          <a:pPr marL="0" lvl="0" indent="0" algn="l" defTabSz="1333500">
+          <a:pPr lvl="0" algn="l" defTabSz="1333500">
             <a:lnSpc>
               <a:spcPct val="90000"/>
             </a:lnSpc>
@@ -5401,7 +5588,6 @@
             <a:spcAft>
               <a:spcPct val="35000"/>
             </a:spcAft>
-            <a:buNone/>
           </a:pPr>
           <a:r>
             <a:rPr lang="en-US" sz="3000" kern="1200" dirty="0" err="1">
@@ -5428,7 +5614,7 @@
             <a:spcAft>
               <a:spcPct val="15000"/>
             </a:spcAft>
-            <a:buChar char="•"/>
+            <a:buChar char="••"/>
           </a:pPr>
           <a:r>
             <a:rPr lang="en-US" sz="2300" kern="1200" dirty="0">
@@ -5462,7 +5648,7 @@
           <a:gsLst>
             <a:gs pos="0">
               <a:schemeClr val="accent5">
-                <a:hueOff val="6010703"/>
+                <a:hueOff val="6010699"/>
                 <a:satOff val="-26380"/>
                 <a:lumOff val="7843"/>
                 <a:alphaOff val="0"/>
@@ -5472,7 +5658,7 @@
             </a:gs>
             <a:gs pos="78000">
               <a:schemeClr val="accent5">
-                <a:hueOff val="6010703"/>
+                <a:hueOff val="6010699"/>
                 <a:satOff val="-26380"/>
                 <a:lumOff val="7843"/>
                 <a:alphaOff val="0"/>
@@ -5522,7 +5708,7 @@
         </a:bodyPr>
         <a:lstStyle/>
         <a:p>
-          <a:pPr marL="0" lvl="0" indent="0" algn="l" defTabSz="1333500">
+          <a:pPr lvl="0" algn="l" defTabSz="1333500">
             <a:lnSpc>
               <a:spcPct val="90000"/>
             </a:lnSpc>
@@ -5532,7 +5718,6 @@
             <a:spcAft>
               <a:spcPct val="35000"/>
             </a:spcAft>
-            <a:buNone/>
           </a:pPr>
           <a:r>
             <a:rPr lang="en-US" sz="3000" kern="1200" dirty="0">
@@ -5554,7 +5739,7 @@
             <a:spcAft>
               <a:spcPct val="15000"/>
             </a:spcAft>
-            <a:buChar char="•"/>
+            <a:buChar char="••"/>
           </a:pPr>
           <a:r>
             <a:rPr lang="en-US" sz="2300" kern="1200" dirty="0">
@@ -5576,7 +5761,7 @@
             <a:spcAft>
               <a:spcPct val="15000"/>
             </a:spcAft>
-            <a:buChar char="•"/>
+            <a:buChar char="••"/>
           </a:pPr>
           <a:r>
             <a:rPr lang="en-US" sz="2300" kern="1200" dirty="0">
@@ -5671,7 +5856,7 @@
             <a:spcAft>
               <a:spcPct val="15000"/>
             </a:spcAft>
-            <a:buChar char="•"/>
+            <a:buChar char="••"/>
           </a:pPr>
           <a:r>
             <a:rPr lang="en-US" sz="1700" kern="1200" dirty="0"/>
@@ -5689,7 +5874,7 @@
             <a:spcAft>
               <a:spcPct val="15000"/>
             </a:spcAft>
-            <a:buChar char="•"/>
+            <a:buChar char="••"/>
           </a:pPr>
           <a:r>
             <a:rPr lang="en-US" sz="1700" kern="1200" dirty="0"/>
@@ -5756,7 +5941,7 @@
         </a:bodyPr>
         <a:lstStyle/>
         <a:p>
-          <a:pPr marL="0" lvl="0" indent="0" algn="ctr" defTabSz="1022350">
+          <a:pPr lvl="0" algn="ctr" defTabSz="1022350">
             <a:lnSpc>
               <a:spcPct val="90000"/>
             </a:lnSpc>
@@ -5766,7 +5951,6 @@
             <a:spcAft>
               <a:spcPct val="35000"/>
             </a:spcAft>
-            <a:buNone/>
           </a:pPr>
           <a:r>
             <a:rPr lang="en-GB" sz="2300" kern="1200" dirty="0" err="1">
@@ -5878,7 +6062,7 @@
             <a:spcAft>
               <a:spcPct val="15000"/>
             </a:spcAft>
-            <a:buChar char="•"/>
+            <a:buChar char="••"/>
           </a:pPr>
           <a:r>
             <a:rPr lang="en-US" sz="1700" kern="1200" dirty="0"/>
@@ -5896,7 +6080,7 @@
             <a:spcAft>
               <a:spcPct val="15000"/>
             </a:spcAft>
-            <a:buChar char="•"/>
+            <a:buChar char="••"/>
           </a:pPr>
           <a:r>
             <a:rPr lang="en-US" sz="1700" kern="1200" dirty="0"/>
@@ -5963,7 +6147,7 @@
         </a:bodyPr>
         <a:lstStyle/>
         <a:p>
-          <a:pPr marL="0" lvl="0" indent="0" algn="ctr" defTabSz="1022350">
+          <a:pPr lvl="0" algn="ctr" defTabSz="1022350">
             <a:lnSpc>
               <a:spcPct val="90000"/>
             </a:lnSpc>
@@ -5973,7 +6157,6 @@
             <a:spcAft>
               <a:spcPct val="35000"/>
             </a:spcAft>
-            <a:buNone/>
           </a:pPr>
           <a:r>
             <a:rPr lang="en-GB" sz="2300" kern="1200" dirty="0">
@@ -6077,7 +6260,7 @@
             <a:spcAft>
               <a:spcPct val="15000"/>
             </a:spcAft>
-            <a:buChar char="•"/>
+            <a:buChar char="••"/>
           </a:pPr>
           <a:r>
             <a:rPr lang="en-US" sz="1700" kern="1200" dirty="0"/>
@@ -6095,7 +6278,7 @@
             <a:spcAft>
               <a:spcPct val="15000"/>
             </a:spcAft>
-            <a:buChar char="•"/>
+            <a:buChar char="••"/>
           </a:pPr>
           <a:r>
             <a:rPr lang="en-US" sz="1700" kern="1200" dirty="0"/>
@@ -6162,7 +6345,7 @@
         </a:bodyPr>
         <a:lstStyle/>
         <a:p>
-          <a:pPr marL="0" lvl="0" indent="0" algn="ctr" defTabSz="1022350">
+          <a:pPr lvl="0" algn="ctr" defTabSz="1022350">
             <a:lnSpc>
               <a:spcPct val="90000"/>
             </a:lnSpc>
@@ -6172,7 +6355,6 @@
             <a:spcAft>
               <a:spcPct val="35000"/>
             </a:spcAft>
-            <a:buNone/>
           </a:pPr>
           <a:r>
             <a:rPr lang="en-GB" sz="2300" kern="1200" dirty="0">
@@ -6268,7 +6450,7 @@
             <a:spcAft>
               <a:spcPct val="15000"/>
             </a:spcAft>
-            <a:buChar char="•"/>
+            <a:buChar char="••"/>
           </a:pPr>
           <a:r>
             <a:rPr lang="en-US" sz="1700" kern="1200" dirty="0"/>
@@ -6286,7 +6468,7 @@
             <a:spcAft>
               <a:spcPct val="15000"/>
             </a:spcAft>
-            <a:buChar char="•"/>
+            <a:buChar char="••"/>
           </a:pPr>
           <a:r>
             <a:rPr lang="en-US" sz="1700" kern="1200" dirty="0"/>
@@ -6353,7 +6535,7 @@
         </a:bodyPr>
         <a:lstStyle/>
         <a:p>
-          <a:pPr marL="0" lvl="0" indent="0" algn="ctr" defTabSz="1022350">
+          <a:pPr lvl="0" algn="ctr" defTabSz="1022350">
             <a:lnSpc>
               <a:spcPct val="90000"/>
             </a:lnSpc>
@@ -6363,7 +6545,6 @@
             <a:spcAft>
               <a:spcPct val="35000"/>
             </a:spcAft>
-            <a:buNone/>
           </a:pPr>
           <a:r>
             <a:rPr lang="en-GB" sz="2300" kern="1200" dirty="0" err="1">
@@ -6459,7 +6640,7 @@
             <a:spcAft>
               <a:spcPct val="15000"/>
             </a:spcAft>
-            <a:buChar char="•"/>
+            <a:buChar char="••"/>
           </a:pPr>
           <a:r>
             <a:rPr lang="en-US" sz="1700" kern="1200" dirty="0"/>
@@ -6477,7 +6658,7 @@
             <a:spcAft>
               <a:spcPct val="15000"/>
             </a:spcAft>
-            <a:buChar char="•"/>
+            <a:buChar char="••"/>
           </a:pPr>
           <a:r>
             <a:rPr lang="en-US" sz="1700" kern="1200" dirty="0"/>
@@ -6544,7 +6725,7 @@
         </a:bodyPr>
         <a:lstStyle/>
         <a:p>
-          <a:pPr marL="0" lvl="0" indent="0" algn="ctr" defTabSz="1022350">
+          <a:pPr lvl="0" algn="ctr" defTabSz="1022350">
             <a:lnSpc>
               <a:spcPct val="90000"/>
             </a:lnSpc>
@@ -6554,7 +6735,6 @@
             <a:spcAft>
               <a:spcPct val="35000"/>
             </a:spcAft>
-            <a:buNone/>
           </a:pPr>
           <a:r>
             <a:rPr lang="en-GB" sz="2300" kern="1200" dirty="0" err="1">
@@ -6641,7 +6821,7 @@
         </a:bodyPr>
         <a:lstStyle/>
         <a:p>
-          <a:pPr marL="0" lvl="0" indent="0" algn="r" defTabSz="1066800">
+          <a:pPr lvl="0" algn="r" defTabSz="1066800">
             <a:lnSpc>
               <a:spcPct val="90000"/>
             </a:lnSpc>
@@ -6651,7 +6831,6 @@
             <a:spcAft>
               <a:spcPct val="35000"/>
             </a:spcAft>
-            <a:buNone/>
           </a:pPr>
           <a:r>
             <a:rPr lang="en-GB" sz="2400" kern="1200" dirty="0" err="1">
@@ -6794,7 +6973,7 @@
             <a:spcAft>
               <a:spcPct val="15000"/>
             </a:spcAft>
-            <a:buChar char="•"/>
+            <a:buChar char="••"/>
           </a:pPr>
           <a:r>
             <a:rPr lang="en-US" sz="2400" kern="1200" dirty="0"/>
@@ -6812,7 +6991,7 @@
             <a:spcAft>
               <a:spcPct val="15000"/>
             </a:spcAft>
-            <a:buChar char="•"/>
+            <a:buChar char="••"/>
           </a:pPr>
           <a:r>
             <a:rPr lang="en-US" sz="2400" kern="1200" dirty="0"/>
@@ -6862,7 +7041,7 @@
         </a:bodyPr>
         <a:lstStyle/>
         <a:p>
-          <a:pPr marL="0" lvl="0" indent="0" algn="r" defTabSz="1066800">
+          <a:pPr lvl="0" algn="r" defTabSz="1066800">
             <a:lnSpc>
               <a:spcPct val="90000"/>
             </a:lnSpc>
@@ -6872,7 +7051,6 @@
             <a:spcAft>
               <a:spcPct val="35000"/>
             </a:spcAft>
-            <a:buNone/>
           </a:pPr>
           <a:r>
             <a:rPr lang="en-GB" sz="2400" kern="1200" dirty="0">
@@ -7015,7 +7193,7 @@
             <a:spcAft>
               <a:spcPct val="15000"/>
             </a:spcAft>
-            <a:buChar char="•"/>
+            <a:buChar char="••"/>
           </a:pPr>
           <a:r>
             <a:rPr lang="en-US" sz="2400" kern="1200" dirty="0"/>
@@ -7033,7 +7211,7 @@
             <a:spcAft>
               <a:spcPct val="15000"/>
             </a:spcAft>
-            <a:buChar char="•"/>
+            <a:buChar char="••"/>
           </a:pPr>
           <a:r>
             <a:rPr lang="en-US" sz="2400" kern="1200" dirty="0"/>
@@ -7083,7 +7261,7 @@
         </a:bodyPr>
         <a:lstStyle/>
         <a:p>
-          <a:pPr marL="0" lvl="0" indent="0" algn="r" defTabSz="1066800">
+          <a:pPr lvl="0" algn="r" defTabSz="1066800">
             <a:lnSpc>
               <a:spcPct val="90000"/>
             </a:lnSpc>
@@ -7093,7 +7271,6 @@
             <a:spcAft>
               <a:spcPct val="35000"/>
             </a:spcAft>
-            <a:buNone/>
           </a:pPr>
           <a:r>
             <a:rPr lang="en-GB" sz="2400" kern="1200" dirty="0">
@@ -7228,7 +7405,7 @@
             <a:spcAft>
               <a:spcPct val="15000"/>
             </a:spcAft>
-            <a:buChar char="•"/>
+            <a:buChar char="••"/>
           </a:pPr>
           <a:r>
             <a:rPr lang="en-US" sz="2400" kern="1200" dirty="0"/>
@@ -7246,7 +7423,7 @@
             <a:spcAft>
               <a:spcPct val="15000"/>
             </a:spcAft>
-            <a:buChar char="•"/>
+            <a:buChar char="••"/>
           </a:pPr>
           <a:r>
             <a:rPr lang="en-US" sz="2400" kern="1200" dirty="0"/>
@@ -7296,7 +7473,7 @@
         </a:bodyPr>
         <a:lstStyle/>
         <a:p>
-          <a:pPr marL="0" lvl="0" indent="0" algn="r" defTabSz="1066800">
+          <a:pPr lvl="0" algn="r" defTabSz="1066800">
             <a:lnSpc>
               <a:spcPct val="90000"/>
             </a:lnSpc>
@@ -7306,7 +7483,6 @@
             <a:spcAft>
               <a:spcPct val="35000"/>
             </a:spcAft>
-            <a:buNone/>
           </a:pPr>
           <a:r>
             <a:rPr lang="en-GB" sz="2400" kern="1200" dirty="0" err="1">
@@ -7441,7 +7617,7 @@
             <a:spcAft>
               <a:spcPct val="15000"/>
             </a:spcAft>
-            <a:buChar char="•"/>
+            <a:buChar char="••"/>
           </a:pPr>
           <a:r>
             <a:rPr lang="en-US" sz="2400" kern="1200" dirty="0"/>
@@ -7459,7 +7635,7 @@
             <a:spcAft>
               <a:spcPct val="15000"/>
             </a:spcAft>
-            <a:buChar char="•"/>
+            <a:buChar char="••"/>
           </a:pPr>
           <a:r>
             <a:rPr lang="en-US" sz="2400" kern="1200" dirty="0"/>
@@ -7509,7 +7685,7 @@
         </a:bodyPr>
         <a:lstStyle/>
         <a:p>
-          <a:pPr marL="0" lvl="0" indent="0" algn="r" defTabSz="1066800">
+          <a:pPr lvl="0" algn="r" defTabSz="1066800">
             <a:lnSpc>
               <a:spcPct val="90000"/>
             </a:lnSpc>
@@ -7519,7 +7695,6 @@
             <a:spcAft>
               <a:spcPct val="35000"/>
             </a:spcAft>
-            <a:buNone/>
           </a:pPr>
           <a:r>
             <a:rPr lang="en-GB" sz="2400" kern="1200" dirty="0" err="1">
@@ -7662,7 +7837,7 @@
             <a:spcAft>
               <a:spcPct val="15000"/>
             </a:spcAft>
-            <a:buChar char="•"/>
+            <a:buChar char="••"/>
           </a:pPr>
           <a:r>
             <a:rPr lang="en-US" sz="2400" kern="1200" dirty="0"/>
@@ -7680,7 +7855,7 @@
             <a:spcAft>
               <a:spcPct val="15000"/>
             </a:spcAft>
-            <a:buChar char="•"/>
+            <a:buChar char="••"/>
           </a:pPr>
           <a:r>
             <a:rPr lang="en-US" sz="2400" kern="1200" dirty="0"/>
@@ -17224,7 +17399,7 @@
           <p:nvPr/>
         </p:nvPicPr>
         <p:blipFill rotWithShape="1">
-          <a:blip r:embed="rId2">
+          <a:blip r:embed="rId2" cstate="print">
             <a:duotone>
               <a:prstClr val="black"/>
               <a:prstClr val="white"/>
@@ -17333,7 +17508,7 @@
           <p:nvPr>
             <p:extLst>
               <p:ext uri="{386F3935-93C4-4BCD-93E2-E3B085C9AB24}">
-                <p16:designElem xmlns:p16="http://schemas.microsoft.com/office/powerpoint/2015/main" val="1"/>
+                <p16:designElem xmlns:p16="http://schemas.microsoft.com/office/powerpoint/2015/main" xmlns="" val="1"/>
               </p:ext>
             </p:extLst>
           </p:nvPr>
@@ -17378,7 +17553,7 @@
           <p:nvPr>
             <p:extLst>
               <p:ext uri="{386F3935-93C4-4BCD-93E2-E3B085C9AB24}">
-                <p16:designElem xmlns:p16="http://schemas.microsoft.com/office/powerpoint/2015/main" val="1"/>
+                <p16:designElem xmlns:p16="http://schemas.microsoft.com/office/powerpoint/2015/main" xmlns="" val="1"/>
               </p:ext>
             </p:extLst>
           </p:nvPr>
@@ -17423,7 +17598,7 @@
           <p:nvPr>
             <p:extLst>
               <p:ext uri="{386F3935-93C4-4BCD-93E2-E3B085C9AB24}">
-                <p16:designElem xmlns:p16="http://schemas.microsoft.com/office/powerpoint/2015/main" val="1"/>
+                <p16:designElem xmlns:p16="http://schemas.microsoft.com/office/powerpoint/2015/main" xmlns="" val="1"/>
               </p:ext>
             </p:extLst>
           </p:nvPr>
@@ -17494,7 +17669,7 @@
           <p:nvPr>
             <p:extLst>
               <p:ext uri="{386F3935-93C4-4BCD-93E2-E3B085C9AB24}">
-                <p16:designElem xmlns:p16="http://schemas.microsoft.com/office/powerpoint/2015/main" val="1"/>
+                <p16:designElem xmlns:p16="http://schemas.microsoft.com/office/powerpoint/2015/main" xmlns="" val="1"/>
               </p:ext>
             </p:extLst>
           </p:nvPr>
@@ -17565,7 +17740,7 @@
           <p:nvPr>
             <p:extLst>
               <p:ext uri="{386F3935-93C4-4BCD-93E2-E3B085C9AB24}">
-                <p16:designElem xmlns:p16="http://schemas.microsoft.com/office/powerpoint/2015/main" val="1"/>
+                <p16:designElem xmlns:p16="http://schemas.microsoft.com/office/powerpoint/2015/main" xmlns="" val="1"/>
               </p:ext>
             </p:extLst>
           </p:nvPr>
@@ -17614,7 +17789,7 @@
           <p:nvPr>
             <p:extLst>
               <p:ext uri="{386F3935-93C4-4BCD-93E2-E3B085C9AB24}">
-                <p16:designElem xmlns:p16="http://schemas.microsoft.com/office/powerpoint/2015/main" val="1"/>
+                <p16:designElem xmlns:p16="http://schemas.microsoft.com/office/powerpoint/2015/main" xmlns="" val="1"/>
               </p:ext>
             </p:extLst>
           </p:nvPr>
@@ -17686,7 +17861,7 @@
           <p:nvPr>
             <p:extLst>
               <p:ext uri="{386F3935-93C4-4BCD-93E2-E3B085C9AB24}">
-                <p16:designElem xmlns:p16="http://schemas.microsoft.com/office/powerpoint/2015/main" val="1"/>
+                <p16:designElem xmlns:p16="http://schemas.microsoft.com/office/powerpoint/2015/main" xmlns="" val="1"/>
               </p:ext>
             </p:extLst>
           </p:nvPr>
@@ -17759,7 +17934,7 @@
           <p:nvPr>
             <p:extLst>
               <p:ext uri="{386F3935-93C4-4BCD-93E2-E3B085C9AB24}">
-                <p16:designElem xmlns:p16="http://schemas.microsoft.com/office/powerpoint/2015/main" val="1"/>
+                <p16:designElem xmlns:p16="http://schemas.microsoft.com/office/powerpoint/2015/main" xmlns="" val="1"/>
               </p:ext>
             </p:extLst>
           </p:nvPr>
@@ -17830,7 +18005,7 @@
           <p:nvPr>
             <p:extLst>
               <p:ext uri="{386F3935-93C4-4BCD-93E2-E3B085C9AB24}">
-                <p16:designElem xmlns:p16="http://schemas.microsoft.com/office/powerpoint/2015/main" val="1"/>
+                <p16:designElem xmlns:p16="http://schemas.microsoft.com/office/powerpoint/2015/main" xmlns="" val="1"/>
               </p:ext>
             </p:extLst>
           </p:nvPr>
@@ -18171,23 +18346,63 @@
             <p:ph idx="1"/>
           </p:nvPr>
         </p:nvSpPr>
-        <p:spPr/>
+        <p:spPr>
+          <a:xfrm>
+            <a:off x="628348" y="1980975"/>
+            <a:ext cx="8596668" cy="3880773"/>
+          </a:xfrm>
+        </p:spPr>
         <p:txBody>
           <a:bodyPr/>
           <a:lstStyle/>
           <a:p>
+            <a:pPr algn="just"/>
             <a:r>
-              <a:rPr lang="en-GB" dirty="0"/>
-              <a:t> </a:t>
-            </a:r>
-            <a:r>
-              <a:rPr lang="en-GB" dirty="0">
+              <a:rPr lang="bg-BG" dirty="0">
                 <a:solidFill>
                   <a:schemeClr val="tx1"/>
                 </a:solidFill>
               </a:rPr>
-              <a:t>photo of the game</a:t>
+              <a:t>In Rulers of Kepler you are the one who must conquer the realm of Kepler. Do you have the strategical skills and cunning to crush your foes and lead your nation to victory? Are you ready to build an empire which lasts through the ages?</a:t>
             </a:r>
+          </a:p>
+          <a:p>
+            <a:pPr algn="just"/>
+            <a:r>
+              <a:rPr lang="bg-BG" dirty="0">
+                <a:solidFill>
+                  <a:schemeClr val="tx1"/>
+                </a:solidFill>
+              </a:rPr>
+              <a:t>Rulers of Kepler is a strategic war game in which you start by controlling a territory and you have to expand by conquering other territories and defeating other players.</a:t>
+            </a:r>
+          </a:p>
+          <a:p>
+            <a:pPr algn="just"/>
+            <a:r>
+              <a:rPr lang="bg-BG" dirty="0">
+                <a:solidFill>
+                  <a:schemeClr val="tx1"/>
+                </a:solidFill>
+              </a:rPr>
+              <a:t>Every territory has its own resources and population that you can use to expand your army. Throughout the game you will be expected to use these resources to expand your research, win points and defeat your opponents.</a:t>
+            </a:r>
+          </a:p>
+          <a:p>
+            <a:pPr algn="just"/>
+            <a:r>
+              <a:rPr lang="bg-BG" dirty="0">
+                <a:solidFill>
+                  <a:schemeClr val="tx1"/>
+                </a:solidFill>
+              </a:rPr>
+              <a:t>The best players ever are shown off on the scoreboard. Do you have the guts to be one of them?</a:t>
+            </a:r>
+            <a:endParaRPr lang="bg-BG" dirty="0">
+              <a:solidFill>
+                <a:schemeClr val="tx1"/>
+              </a:solidFill>
+            </a:endParaRPr>
           </a:p>
         </p:txBody>
       </p:sp>
@@ -19196,7 +19411,7 @@
   <a:extraClrSchemeLst/>
   <a:extLst>
     <a:ext uri="{05A4C25C-085E-4340-85A3-A5531E510DB2}">
-      <thm15:themeFamily xmlns:thm15="http://schemas.microsoft.com/office/thememl/2012/main" name="Facet" id="{C0C680CD-088A-49FC-A102-D699147F32B2}" vid="{CFBC31BA-B70F-4F30-BCAA-4F3011E16C4D}"/>
+      <thm15:themeFamily xmlns:thm15="http://schemas.microsoft.com/office/thememl/2012/main" xmlns="" name="Facet" id="{C0C680CD-088A-49FC-A102-D699147F32B2}" vid="{CFBC31BA-B70F-4F30-BCAA-4F3011E16C4D}"/>
     </a:ext>
   </a:extLst>
 </a:theme>

</xml_diff>

<commit_message>
Fixed some stuff, started making the presentation better.
</commit_message>
<xml_diff>
--- a/presentation/Kepler.pptx
+++ b/presentation/Kepler.pptx
@@ -115,7 +115,18 @@
   </p:defaultTextStyle>
   <p:extLst>
     <p:ext uri="{EFAFB233-063F-42B5-8137-9DF3F51BA10A}">
-      <p15:sldGuideLst xmlns:p15="http://schemas.microsoft.com/office/powerpoint/2012/main" xmlns=""/>
+      <p15:sldGuideLst xmlns:p15="http://schemas.microsoft.com/office/powerpoint/2012/main">
+        <p15:guide id="1" orient="horz" pos="2160">
+          <p15:clr>
+            <a:srgbClr val="A4A3A4"/>
+          </p15:clr>
+        </p15:guide>
+        <p15:guide id="2" pos="3840">
+          <p15:clr>
+            <a:srgbClr val="A4A3A4"/>
+          </p15:clr>
+        </p15:guide>
+      </p15:sldGuideLst>
     </p:ext>
   </p:extLst>
 </p:presentation>
@@ -3141,13 +3152,6 @@
         </dgm:presLayoutVars>
       </dgm:prSet>
       <dgm:spPr/>
-      <dgm:t>
-        <a:bodyPr/>
-        <a:lstStyle/>
-        <a:p>
-          <a:endParaRPr lang="en-GB"/>
-        </a:p>
-      </dgm:t>
     </dgm:pt>
     <dgm:pt modelId="{50E1F76B-E30A-4DFB-BDA5-FE05736D942D}" type="pres">
       <dgm:prSet presAssocID="{B2BA5AA5-E4C8-46C6-86A7-8FDB75ADA769}" presName="node" presStyleLbl="node1" presStyleIdx="0" presStyleCnt="4">
@@ -3156,13 +3160,6 @@
         </dgm:presLayoutVars>
       </dgm:prSet>
       <dgm:spPr/>
-      <dgm:t>
-        <a:bodyPr/>
-        <a:lstStyle/>
-        <a:p>
-          <a:endParaRPr lang="en-GB"/>
-        </a:p>
-      </dgm:t>
     </dgm:pt>
     <dgm:pt modelId="{B00E5579-C390-4F6F-83A4-DC3A5BA1D638}" type="pres">
       <dgm:prSet presAssocID="{765F6DE7-AA46-40F3-921A-AC7560646B5A}" presName="sibTrans" presStyleCnt="0"/>
@@ -3175,13 +3172,6 @@
         </dgm:presLayoutVars>
       </dgm:prSet>
       <dgm:spPr/>
-      <dgm:t>
-        <a:bodyPr/>
-        <a:lstStyle/>
-        <a:p>
-          <a:endParaRPr lang="en-GB"/>
-        </a:p>
-      </dgm:t>
     </dgm:pt>
     <dgm:pt modelId="{C6C7764D-7A7A-443E-9F10-40F7C49D5F0A}" type="pres">
       <dgm:prSet presAssocID="{5EBDD160-3F16-494A-8D48-CFBF232FEB70}" presName="sibTrans" presStyleCnt="0"/>
@@ -3194,13 +3184,6 @@
         </dgm:presLayoutVars>
       </dgm:prSet>
       <dgm:spPr/>
-      <dgm:t>
-        <a:bodyPr/>
-        <a:lstStyle/>
-        <a:p>
-          <a:endParaRPr lang="en-GB"/>
-        </a:p>
-      </dgm:t>
     </dgm:pt>
     <dgm:pt modelId="{6EC72C29-4F23-4D71-863E-0CFAD1F15EEF}" type="pres">
       <dgm:prSet presAssocID="{90E57956-7BDF-4795-898F-E641DD3E4D44}" presName="sibTrans" presStyleCnt="0"/>
@@ -3213,41 +3196,34 @@
         </dgm:presLayoutVars>
       </dgm:prSet>
       <dgm:spPr/>
-      <dgm:t>
-        <a:bodyPr/>
-        <a:lstStyle/>
-        <a:p>
-          <a:endParaRPr lang="en-GB"/>
-        </a:p>
-      </dgm:t>
     </dgm:pt>
   </dgm:ptLst>
   <dgm:cxnLst>
+    <dgm:cxn modelId="{E23AE502-7D55-4F00-A7F1-A42476D23003}" srcId="{1731E6B2-48C7-4474-9633-68EA83567DFE}" destId="{7EB24D3F-0313-47C8-B53D-F8B1A279B646}" srcOrd="0" destOrd="0" parTransId="{793E6C47-5988-4E40-AEEB-6AD2C39E154D}" sibTransId="{17AD24AF-F3C9-4948-8369-51E5ADD5E9FB}"/>
+    <dgm:cxn modelId="{1FA62506-D310-4F00-88E0-758EA26CF792}" type="presOf" srcId="{C4F6841E-56D3-46EF-B11F-4FEEF792947E}" destId="{667EBB5A-149B-4777-BB12-18ECD4849C3C}" srcOrd="0" destOrd="2" presId="urn:microsoft.com/office/officeart/2005/8/layout/hList6"/>
+    <dgm:cxn modelId="{E2BB040E-8968-49BF-8F69-2809FC144296}" type="presOf" srcId="{CA459A44-4CE0-4505-B14C-7B8F7F305B78}" destId="{50E1F76B-E30A-4DFB-BDA5-FE05736D942D}" srcOrd="0" destOrd="2" presId="urn:microsoft.com/office/officeart/2005/8/layout/hList6"/>
+    <dgm:cxn modelId="{642EC510-837E-4A5C-9E6E-6CEAC75186ED}" type="presOf" srcId="{1731E6B2-48C7-4474-9633-68EA83567DFE}" destId="{EDADEB29-DBB4-45C0-A1F9-27C4FE15A8E2}" srcOrd="0" destOrd="0" presId="urn:microsoft.com/office/officeart/2005/8/layout/hList6"/>
+    <dgm:cxn modelId="{B8F4341D-D3C5-4B9C-91D1-0D50FEFB3CD0}" srcId="{B2BA5AA5-E4C8-46C6-86A7-8FDB75ADA769}" destId="{42C9FAA2-A133-4E0B-A2F8-BB9F214A7B1B}" srcOrd="0" destOrd="0" parTransId="{B2578383-711F-4128-B95D-D45E79F341DE}" sibTransId="{2F5A8654-CE7E-4CAA-9C89-1F4AFE7773DA}"/>
     <dgm:cxn modelId="{E03B6322-9F8D-4AFA-8C1E-2F209DE56AA7}" type="presOf" srcId="{B2BA5AA5-E4C8-46C6-86A7-8FDB75ADA769}" destId="{50E1F76B-E30A-4DFB-BDA5-FE05736D942D}" srcOrd="0" destOrd="0" presId="urn:microsoft.com/office/officeart/2005/8/layout/hList6"/>
+    <dgm:cxn modelId="{F332BF28-2C32-40C9-8C7B-630C53CC47BB}" type="presOf" srcId="{42C9FAA2-A133-4E0B-A2F8-BB9F214A7B1B}" destId="{50E1F76B-E30A-4DFB-BDA5-FE05736D942D}" srcOrd="0" destOrd="1" presId="urn:microsoft.com/office/officeart/2005/8/layout/hList6"/>
     <dgm:cxn modelId="{933E8A2C-C371-437A-A610-3C7DCFCE38D8}" srcId="{D83A51AD-CC9A-4032-B318-201779A63292}" destId="{80E44257-540F-4B8E-B32F-B0A926BA723A}" srcOrd="0" destOrd="0" parTransId="{C11B3905-06A7-46CC-9320-702DE24CF571}" sibTransId="{3B7172C5-BB6A-4BD1-98A1-4F97448A0772}"/>
+    <dgm:cxn modelId="{F470C02F-6273-4445-B66E-7FAD3BAC276E}" type="presOf" srcId="{80E44257-540F-4B8E-B32F-B0A926BA723A}" destId="{667EBB5A-149B-4777-BB12-18ECD4849C3C}" srcOrd="0" destOrd="1" presId="urn:microsoft.com/office/officeart/2005/8/layout/hList6"/>
+    <dgm:cxn modelId="{5B211638-8B34-49D4-BFD1-0E98E84ED27F}" srcId="{289F72A1-72FD-42D2-9215-8921D988499D}" destId="{B2BA5AA5-E4C8-46C6-86A7-8FDB75ADA769}" srcOrd="0" destOrd="0" parTransId="{110BC991-79D1-4A5F-AE8E-185C8CE22726}" sibTransId="{765F6DE7-AA46-40F3-921A-AC7560646B5A}"/>
+    <dgm:cxn modelId="{8B9CB762-1369-435E-98E1-0C99B2D89B29}" type="presOf" srcId="{02BE9D49-D171-436C-8293-430DB634E1EA}" destId="{EDADEB29-DBB4-45C0-A1F9-27C4FE15A8E2}" srcOrd="0" destOrd="2" presId="urn:microsoft.com/office/officeart/2005/8/layout/hList6"/>
+    <dgm:cxn modelId="{EFB8AF44-0A08-4055-A10B-E86118FF3CC4}" srcId="{289F72A1-72FD-42D2-9215-8921D988499D}" destId="{1731E6B2-48C7-4474-9633-68EA83567DFE}" srcOrd="1" destOrd="0" parTransId="{87C9EFB7-2FF4-41CF-8A17-DD3EB1C151B9}" sibTransId="{5EBDD160-3F16-494A-8D48-CFBF232FEB70}"/>
+    <dgm:cxn modelId="{B4CA994A-F559-460A-AC44-A8238C862C7F}" type="presOf" srcId="{92A55C23-160C-4FC1-8AE7-A948A3ECA79C}" destId="{50E1F76B-E30A-4DFB-BDA5-FE05736D942D}" srcOrd="0" destOrd="3" presId="urn:microsoft.com/office/officeart/2005/8/layout/hList6"/>
+    <dgm:cxn modelId="{B7FAFC52-9AE0-4FE2-9B4C-7AF1D5232F24}" srcId="{B2BA5AA5-E4C8-46C6-86A7-8FDB75ADA769}" destId="{92A55C23-160C-4FC1-8AE7-A948A3ECA79C}" srcOrd="2" destOrd="0" parTransId="{9C2FA982-4267-429A-8CC0-AD5B9FC67F1C}" sibTransId="{26FB71AB-A4AA-426C-8234-38E18C188E7D}"/>
+    <dgm:cxn modelId="{A4BA3C90-076D-4ED0-A494-00E296F45DE5}" srcId="{8BCFB72E-BED5-4F0F-8BFC-5EBD0EA2E424}" destId="{761623E8-8A67-4F8D-A182-D79734280574}" srcOrd="0" destOrd="0" parTransId="{4A572FB6-B607-4DA9-A072-EBE686AC45D8}" sibTransId="{5B8C3981-2087-444D-BFA6-1E4D08DD0DAC}"/>
+    <dgm:cxn modelId="{84EB2596-89FE-4902-A137-E976781752B2}" srcId="{1731E6B2-48C7-4474-9633-68EA83567DFE}" destId="{02BE9D49-D171-436C-8293-430DB634E1EA}" srcOrd="1" destOrd="0" parTransId="{BA836069-46EF-46E8-A053-D736F1EEFD78}" sibTransId="{F6B2C6F7-41D2-4391-92C1-E44D5924618E}"/>
+    <dgm:cxn modelId="{DC71F798-5F56-42A1-9665-C7F9C3BD7463}" type="presOf" srcId="{761623E8-8A67-4F8D-A182-D79734280574}" destId="{15905494-B7DC-4F95-BD9E-F0E1E6E89898}" srcOrd="0" destOrd="1" presId="urn:microsoft.com/office/officeart/2005/8/layout/hList6"/>
+    <dgm:cxn modelId="{DBBFCEBA-C13A-4B52-9C48-1B24E3C7A76E}" type="presOf" srcId="{D83A51AD-CC9A-4032-B318-201779A63292}" destId="{667EBB5A-149B-4777-BB12-18ECD4849C3C}" srcOrd="0" destOrd="0" presId="urn:microsoft.com/office/officeart/2005/8/layout/hList6"/>
     <dgm:cxn modelId="{B7A886CA-2EE0-4B49-8DE0-2152700FE6CF}" type="presOf" srcId="{289F72A1-72FD-42D2-9215-8921D988499D}" destId="{512B9203-D80B-4494-A4F8-6B48E3B17065}" srcOrd="0" destOrd="0" presId="urn:microsoft.com/office/officeart/2005/8/layout/hList6"/>
-    <dgm:cxn modelId="{84EB2596-89FE-4902-A137-E976781752B2}" srcId="{1731E6B2-48C7-4474-9633-68EA83567DFE}" destId="{02BE9D49-D171-436C-8293-430DB634E1EA}" srcOrd="1" destOrd="0" parTransId="{BA836069-46EF-46E8-A053-D736F1EEFD78}" sibTransId="{F6B2C6F7-41D2-4391-92C1-E44D5924618E}"/>
-    <dgm:cxn modelId="{1FA62506-D310-4F00-88E0-758EA26CF792}" type="presOf" srcId="{C4F6841E-56D3-46EF-B11F-4FEEF792947E}" destId="{667EBB5A-149B-4777-BB12-18ECD4849C3C}" srcOrd="0" destOrd="2" presId="urn:microsoft.com/office/officeart/2005/8/layout/hList6"/>
-    <dgm:cxn modelId="{EFB8AF44-0A08-4055-A10B-E86118FF3CC4}" srcId="{289F72A1-72FD-42D2-9215-8921D988499D}" destId="{1731E6B2-48C7-4474-9633-68EA83567DFE}" srcOrd="1" destOrd="0" parTransId="{87C9EFB7-2FF4-41CF-8A17-DD3EB1C151B9}" sibTransId="{5EBDD160-3F16-494A-8D48-CFBF232FEB70}"/>
-    <dgm:cxn modelId="{F470C02F-6273-4445-B66E-7FAD3BAC276E}" type="presOf" srcId="{80E44257-540F-4B8E-B32F-B0A926BA723A}" destId="{667EBB5A-149B-4777-BB12-18ECD4849C3C}" srcOrd="0" destOrd="1" presId="urn:microsoft.com/office/officeart/2005/8/layout/hList6"/>
+    <dgm:cxn modelId="{5F8576CB-E258-4263-AF21-54302E7A51E8}" srcId="{D83A51AD-CC9A-4032-B318-201779A63292}" destId="{C4F6841E-56D3-46EF-B11F-4FEEF792947E}" srcOrd="1" destOrd="0" parTransId="{0C29E260-2805-4930-92AB-52914D002E2B}" sibTransId="{F2E0B183-7C15-4B4C-BB5B-42DCDCAC7979}"/>
+    <dgm:cxn modelId="{913433D3-F17F-4FA6-A063-E5BA0F616215}" type="presOf" srcId="{8BCFB72E-BED5-4F0F-8BFC-5EBD0EA2E424}" destId="{15905494-B7DC-4F95-BD9E-F0E1E6E89898}" srcOrd="0" destOrd="0" presId="urn:microsoft.com/office/officeart/2005/8/layout/hList6"/>
+    <dgm:cxn modelId="{62BDCAD8-4C5E-40A2-8067-A4042E2FC4AE}" srcId="{289F72A1-72FD-42D2-9215-8921D988499D}" destId="{8BCFB72E-BED5-4F0F-8BFC-5EBD0EA2E424}" srcOrd="2" destOrd="0" parTransId="{07AC890E-5D06-4039-9445-33507A789B65}" sibTransId="{90E57956-7BDF-4795-898F-E641DD3E4D44}"/>
+    <dgm:cxn modelId="{45C11DF2-B0CC-485E-9188-D7333F0F3982}" type="presOf" srcId="{7EB24D3F-0313-47C8-B53D-F8B1A279B646}" destId="{EDADEB29-DBB4-45C0-A1F9-27C4FE15A8E2}" srcOrd="0" destOrd="1" presId="urn:microsoft.com/office/officeart/2005/8/layout/hList6"/>
+    <dgm:cxn modelId="{A18EC5F9-9F75-4E32-8661-A8BC7B691FF6}" srcId="{289F72A1-72FD-42D2-9215-8921D988499D}" destId="{D83A51AD-CC9A-4032-B318-201779A63292}" srcOrd="3" destOrd="0" parTransId="{66838EE5-EAE3-420F-B11B-E9FDCF28E956}" sibTransId="{B45B00C0-2838-4B43-94C3-30D3A8009641}"/>
     <dgm:cxn modelId="{0460AAFF-192A-4FFD-86E5-68B86D8D0680}" srcId="{B2BA5AA5-E4C8-46C6-86A7-8FDB75ADA769}" destId="{CA459A44-4CE0-4505-B14C-7B8F7F305B78}" srcOrd="1" destOrd="0" parTransId="{A7BDC22E-E3DD-4C82-BE53-F055A2C1626B}" sibTransId="{E76F5183-D7CB-4B35-B83D-545D4B07B474}"/>
-    <dgm:cxn modelId="{A4BA3C90-076D-4ED0-A494-00E296F45DE5}" srcId="{8BCFB72E-BED5-4F0F-8BFC-5EBD0EA2E424}" destId="{761623E8-8A67-4F8D-A182-D79734280574}" srcOrd="0" destOrd="0" parTransId="{4A572FB6-B607-4DA9-A072-EBE686AC45D8}" sibTransId="{5B8C3981-2087-444D-BFA6-1E4D08DD0DAC}"/>
-    <dgm:cxn modelId="{B7FAFC52-9AE0-4FE2-9B4C-7AF1D5232F24}" srcId="{B2BA5AA5-E4C8-46C6-86A7-8FDB75ADA769}" destId="{92A55C23-160C-4FC1-8AE7-A948A3ECA79C}" srcOrd="2" destOrd="0" parTransId="{9C2FA982-4267-429A-8CC0-AD5B9FC67F1C}" sibTransId="{26FB71AB-A4AA-426C-8234-38E18C188E7D}"/>
-    <dgm:cxn modelId="{913433D3-F17F-4FA6-A063-E5BA0F616215}" type="presOf" srcId="{8BCFB72E-BED5-4F0F-8BFC-5EBD0EA2E424}" destId="{15905494-B7DC-4F95-BD9E-F0E1E6E89898}" srcOrd="0" destOrd="0" presId="urn:microsoft.com/office/officeart/2005/8/layout/hList6"/>
-    <dgm:cxn modelId="{45C11DF2-B0CC-485E-9188-D7333F0F3982}" type="presOf" srcId="{7EB24D3F-0313-47C8-B53D-F8B1A279B646}" destId="{EDADEB29-DBB4-45C0-A1F9-27C4FE15A8E2}" srcOrd="0" destOrd="1" presId="urn:microsoft.com/office/officeart/2005/8/layout/hList6"/>
-    <dgm:cxn modelId="{8B9CB762-1369-435E-98E1-0C99B2D89B29}" type="presOf" srcId="{02BE9D49-D171-436C-8293-430DB634E1EA}" destId="{EDADEB29-DBB4-45C0-A1F9-27C4FE15A8E2}" srcOrd="0" destOrd="2" presId="urn:microsoft.com/office/officeart/2005/8/layout/hList6"/>
-    <dgm:cxn modelId="{5B211638-8B34-49D4-BFD1-0E98E84ED27F}" srcId="{289F72A1-72FD-42D2-9215-8921D988499D}" destId="{B2BA5AA5-E4C8-46C6-86A7-8FDB75ADA769}" srcOrd="0" destOrd="0" parTransId="{110BC991-79D1-4A5F-AE8E-185C8CE22726}" sibTransId="{765F6DE7-AA46-40F3-921A-AC7560646B5A}"/>
-    <dgm:cxn modelId="{F332BF28-2C32-40C9-8C7B-630C53CC47BB}" type="presOf" srcId="{42C9FAA2-A133-4E0B-A2F8-BB9F214A7B1B}" destId="{50E1F76B-E30A-4DFB-BDA5-FE05736D942D}" srcOrd="0" destOrd="1" presId="urn:microsoft.com/office/officeart/2005/8/layout/hList6"/>
-    <dgm:cxn modelId="{E2BB040E-8968-49BF-8F69-2809FC144296}" type="presOf" srcId="{CA459A44-4CE0-4505-B14C-7B8F7F305B78}" destId="{50E1F76B-E30A-4DFB-BDA5-FE05736D942D}" srcOrd="0" destOrd="2" presId="urn:microsoft.com/office/officeart/2005/8/layout/hList6"/>
-    <dgm:cxn modelId="{DC71F798-5F56-42A1-9665-C7F9C3BD7463}" type="presOf" srcId="{761623E8-8A67-4F8D-A182-D79734280574}" destId="{15905494-B7DC-4F95-BD9E-F0E1E6E89898}" srcOrd="0" destOrd="1" presId="urn:microsoft.com/office/officeart/2005/8/layout/hList6"/>
-    <dgm:cxn modelId="{B8F4341D-D3C5-4B9C-91D1-0D50FEFB3CD0}" srcId="{B2BA5AA5-E4C8-46C6-86A7-8FDB75ADA769}" destId="{42C9FAA2-A133-4E0B-A2F8-BB9F214A7B1B}" srcOrd="0" destOrd="0" parTransId="{B2578383-711F-4128-B95D-D45E79F341DE}" sibTransId="{2F5A8654-CE7E-4CAA-9C89-1F4AFE7773DA}"/>
-    <dgm:cxn modelId="{E23AE502-7D55-4F00-A7F1-A42476D23003}" srcId="{1731E6B2-48C7-4474-9633-68EA83567DFE}" destId="{7EB24D3F-0313-47C8-B53D-F8B1A279B646}" srcOrd="0" destOrd="0" parTransId="{793E6C47-5988-4E40-AEEB-6AD2C39E154D}" sibTransId="{17AD24AF-F3C9-4948-8369-51E5ADD5E9FB}"/>
-    <dgm:cxn modelId="{DBBFCEBA-C13A-4B52-9C48-1B24E3C7A76E}" type="presOf" srcId="{D83A51AD-CC9A-4032-B318-201779A63292}" destId="{667EBB5A-149B-4777-BB12-18ECD4849C3C}" srcOrd="0" destOrd="0" presId="urn:microsoft.com/office/officeart/2005/8/layout/hList6"/>
-    <dgm:cxn modelId="{642EC510-837E-4A5C-9E6E-6CEAC75186ED}" type="presOf" srcId="{1731E6B2-48C7-4474-9633-68EA83567DFE}" destId="{EDADEB29-DBB4-45C0-A1F9-27C4FE15A8E2}" srcOrd="0" destOrd="0" presId="urn:microsoft.com/office/officeart/2005/8/layout/hList6"/>
-    <dgm:cxn modelId="{A18EC5F9-9F75-4E32-8661-A8BC7B691FF6}" srcId="{289F72A1-72FD-42D2-9215-8921D988499D}" destId="{D83A51AD-CC9A-4032-B318-201779A63292}" srcOrd="3" destOrd="0" parTransId="{66838EE5-EAE3-420F-B11B-E9FDCF28E956}" sibTransId="{B45B00C0-2838-4B43-94C3-30D3A8009641}"/>
-    <dgm:cxn modelId="{B4CA994A-F559-460A-AC44-A8238C862C7F}" type="presOf" srcId="{92A55C23-160C-4FC1-8AE7-A948A3ECA79C}" destId="{50E1F76B-E30A-4DFB-BDA5-FE05736D942D}" srcOrd="0" destOrd="3" presId="urn:microsoft.com/office/officeart/2005/8/layout/hList6"/>
-    <dgm:cxn modelId="{5F8576CB-E258-4263-AF21-54302E7A51E8}" srcId="{D83A51AD-CC9A-4032-B318-201779A63292}" destId="{C4F6841E-56D3-46EF-B11F-4FEEF792947E}" srcOrd="1" destOrd="0" parTransId="{0C29E260-2805-4930-92AB-52914D002E2B}" sibTransId="{F2E0B183-7C15-4B4C-BB5B-42DCDCAC7979}"/>
-    <dgm:cxn modelId="{62BDCAD8-4C5E-40A2-8067-A4042E2FC4AE}" srcId="{289F72A1-72FD-42D2-9215-8921D988499D}" destId="{8BCFB72E-BED5-4F0F-8BFC-5EBD0EA2E424}" srcOrd="2" destOrd="0" parTransId="{07AC890E-5D06-4039-9445-33507A789B65}" sibTransId="{90E57956-7BDF-4795-898F-E641DD3E4D44}"/>
     <dgm:cxn modelId="{F497AAD2-72CE-4F8E-BC97-646CBF75ADDF}" type="presParOf" srcId="{512B9203-D80B-4494-A4F8-6B48E3B17065}" destId="{50E1F76B-E30A-4DFB-BDA5-FE05736D942D}" srcOrd="0" destOrd="0" presId="urn:microsoft.com/office/officeart/2005/8/layout/hList6"/>
     <dgm:cxn modelId="{58BB92FD-23B8-43D8-AF20-7F1DF1D4295E}" type="presParOf" srcId="{512B9203-D80B-4494-A4F8-6B48E3B17065}" destId="{B00E5579-C390-4F6F-83A4-DC3A5BA1D638}" srcOrd="1" destOrd="0" presId="urn:microsoft.com/office/officeart/2005/8/layout/hList6"/>
     <dgm:cxn modelId="{974CA134-3A1D-4E05-9787-0122DFFA345E}" type="presParOf" srcId="{512B9203-D80B-4494-A4F8-6B48E3B17065}" destId="{EDADEB29-DBB4-45C0-A1F9-27C4FE15A8E2}" srcOrd="2" destOrd="0" presId="urn:microsoft.com/office/officeart/2005/8/layout/hList6"/>
@@ -3946,13 +3922,6 @@
         </dgm:presLayoutVars>
       </dgm:prSet>
       <dgm:spPr/>
-      <dgm:t>
-        <a:bodyPr/>
-        <a:lstStyle/>
-        <a:p>
-          <a:endParaRPr lang="en-GB"/>
-        </a:p>
-      </dgm:t>
     </dgm:pt>
     <dgm:pt modelId="{01284A1E-F536-4B5D-88A8-CBDBC739F037}" type="pres">
       <dgm:prSet presAssocID="{B70D2DD9-1895-4D57-AA6E-3C0612AEEA4A}" presName="linNode" presStyleCnt="0"/>
@@ -3966,13 +3935,6 @@
         </dgm:presLayoutVars>
       </dgm:prSet>
       <dgm:spPr/>
-      <dgm:t>
-        <a:bodyPr/>
-        <a:lstStyle/>
-        <a:p>
-          <a:endParaRPr lang="en-GB"/>
-        </a:p>
-      </dgm:t>
     </dgm:pt>
     <dgm:pt modelId="{DB833F3B-AD51-4576-A22F-30F7EDD83719}" type="pres">
       <dgm:prSet presAssocID="{B70D2DD9-1895-4D57-AA6E-3C0612AEEA4A}" presName="descendantText" presStyleLbl="alignAccFollowNode1" presStyleIdx="0" presStyleCnt="5">
@@ -3981,13 +3943,6 @@
         </dgm:presLayoutVars>
       </dgm:prSet>
       <dgm:spPr/>
-      <dgm:t>
-        <a:bodyPr/>
-        <a:lstStyle/>
-        <a:p>
-          <a:endParaRPr lang="en-GB"/>
-        </a:p>
-      </dgm:t>
     </dgm:pt>
     <dgm:pt modelId="{358A7068-6FCC-4C74-867E-0C5F71BE8399}" type="pres">
       <dgm:prSet presAssocID="{55A3A7DE-9C4E-41F5-A18E-1E98631E092F}" presName="sp" presStyleCnt="0"/>
@@ -4005,13 +3960,6 @@
         </dgm:presLayoutVars>
       </dgm:prSet>
       <dgm:spPr/>
-      <dgm:t>
-        <a:bodyPr/>
-        <a:lstStyle/>
-        <a:p>
-          <a:endParaRPr lang="en-GB"/>
-        </a:p>
-      </dgm:t>
     </dgm:pt>
     <dgm:pt modelId="{37143890-1B18-4E83-A8D8-2E79F91EC88F}" type="pres">
       <dgm:prSet presAssocID="{E1C67297-1CD3-4D24-A1A1-431C2F9D014C}" presName="descendantText" presStyleLbl="alignAccFollowNode1" presStyleIdx="1" presStyleCnt="5">
@@ -4020,13 +3968,6 @@
         </dgm:presLayoutVars>
       </dgm:prSet>
       <dgm:spPr/>
-      <dgm:t>
-        <a:bodyPr/>
-        <a:lstStyle/>
-        <a:p>
-          <a:endParaRPr lang="en-GB"/>
-        </a:p>
-      </dgm:t>
     </dgm:pt>
     <dgm:pt modelId="{49ADE37B-FC93-40A9-81BC-8C673CDC2640}" type="pres">
       <dgm:prSet presAssocID="{5E05C776-3BA7-4BC7-B74B-25B2CCDDD107}" presName="sp" presStyleCnt="0"/>
@@ -4044,13 +3985,6 @@
         </dgm:presLayoutVars>
       </dgm:prSet>
       <dgm:spPr/>
-      <dgm:t>
-        <a:bodyPr/>
-        <a:lstStyle/>
-        <a:p>
-          <a:endParaRPr lang="en-GB"/>
-        </a:p>
-      </dgm:t>
     </dgm:pt>
     <dgm:pt modelId="{4D3CABE8-8E1D-4B01-8A9A-9E6A3179EAF0}" type="pres">
       <dgm:prSet presAssocID="{19CD8B9A-2146-4581-9EF6-F137FE214CDD}" presName="descendantText" presStyleLbl="alignAccFollowNode1" presStyleIdx="2" presStyleCnt="5">
@@ -4059,13 +3993,6 @@
         </dgm:presLayoutVars>
       </dgm:prSet>
       <dgm:spPr/>
-      <dgm:t>
-        <a:bodyPr/>
-        <a:lstStyle/>
-        <a:p>
-          <a:endParaRPr lang="en-GB"/>
-        </a:p>
-      </dgm:t>
     </dgm:pt>
     <dgm:pt modelId="{A0D9CE28-B92A-4C1C-8DE9-36A1C27A6345}" type="pres">
       <dgm:prSet presAssocID="{479E4232-F2DA-49B2-BB05-B1057E11F4B9}" presName="sp" presStyleCnt="0"/>
@@ -4083,13 +4010,6 @@
         </dgm:presLayoutVars>
       </dgm:prSet>
       <dgm:spPr/>
-      <dgm:t>
-        <a:bodyPr/>
-        <a:lstStyle/>
-        <a:p>
-          <a:endParaRPr lang="en-GB"/>
-        </a:p>
-      </dgm:t>
     </dgm:pt>
     <dgm:pt modelId="{29B4C119-7922-4505-B68F-8CA0F9B2D1A8}" type="pres">
       <dgm:prSet presAssocID="{5F76C4F6-766D-4C8C-BA8D-A9A84ADA8CFA}" presName="descendantText" presStyleLbl="alignAccFollowNode1" presStyleIdx="3" presStyleCnt="5">
@@ -4098,13 +4018,6 @@
         </dgm:presLayoutVars>
       </dgm:prSet>
       <dgm:spPr/>
-      <dgm:t>
-        <a:bodyPr/>
-        <a:lstStyle/>
-        <a:p>
-          <a:endParaRPr lang="en-GB"/>
-        </a:p>
-      </dgm:t>
     </dgm:pt>
     <dgm:pt modelId="{469EB1AF-DC94-4E40-A89B-462716B236FF}" type="pres">
       <dgm:prSet presAssocID="{257EB0F2-1184-4A32-8DD5-16D451F39332}" presName="sp" presStyleCnt="0"/>
@@ -4122,13 +4035,6 @@
         </dgm:presLayoutVars>
       </dgm:prSet>
       <dgm:spPr/>
-      <dgm:t>
-        <a:bodyPr/>
-        <a:lstStyle/>
-        <a:p>
-          <a:endParaRPr lang="en-GB"/>
-        </a:p>
-      </dgm:t>
     </dgm:pt>
     <dgm:pt modelId="{1AF74E43-2C09-4698-B017-7B2C06C58F81}" type="pres">
       <dgm:prSet presAssocID="{484745D3-9FFF-4410-8CCF-E22EE580497A}" presName="descendantText" presStyleLbl="alignAccFollowNode1" presStyleIdx="4" presStyleCnt="5">
@@ -4137,47 +4043,40 @@
         </dgm:presLayoutVars>
       </dgm:prSet>
       <dgm:spPr/>
-      <dgm:t>
-        <a:bodyPr/>
-        <a:lstStyle/>
-        <a:p>
-          <a:endParaRPr lang="en-GB"/>
-        </a:p>
-      </dgm:t>
     </dgm:pt>
   </dgm:ptLst>
   <dgm:cxnLst>
-    <dgm:cxn modelId="{F9F4D3B2-C6E0-42DD-92D7-73A4FA607C4D}" srcId="{E1C67297-1CD3-4D24-A1A1-431C2F9D014C}" destId="{A2556B46-1D71-4BA9-A658-824CEAE335CA}" srcOrd="0" destOrd="0" parTransId="{B4815891-554E-4B3E-B5EF-B44A2C7EAE09}" sibTransId="{E5AABB46-7550-4223-AE4D-34F79017D72A}"/>
     <dgm:cxn modelId="{18B67B13-924C-4881-AF36-BFFAF5868195}" type="presOf" srcId="{D759A546-3441-4B67-B1A7-BC5779A425EC}" destId="{4D3CABE8-8E1D-4B01-8A9A-9E6A3179EAF0}" srcOrd="0" destOrd="0" presId="urn:microsoft.com/office/officeart/2005/8/layout/vList5"/>
-    <dgm:cxn modelId="{4F9E74B8-662A-454F-BA28-787660186D5E}" srcId="{E39146F7-1853-4C14-B2BF-91E46DBCCFCC}" destId="{B70D2DD9-1895-4D57-AA6E-3C0612AEEA4A}" srcOrd="0" destOrd="0" parTransId="{DC777B81-5EAF-4686-A350-06E9868E5B25}" sibTransId="{55A3A7DE-9C4E-41F5-A18E-1E98631E092F}"/>
-    <dgm:cxn modelId="{582E9F45-4857-40C4-A0AB-422A87EE178A}" srcId="{484745D3-9FFF-4410-8CCF-E22EE580497A}" destId="{7F2AAD7D-3E1D-408D-AA83-CFC8EDFA0FAE}" srcOrd="0" destOrd="0" parTransId="{80750E1E-B191-4ADB-986F-F7C06AE205CB}" sibTransId="{4D09D464-8F14-48A2-9CE4-52BE95501310}"/>
-    <dgm:cxn modelId="{4DDA1BBE-4C6C-4530-9C47-5858347829A1}" type="presOf" srcId="{E39146F7-1853-4C14-B2BF-91E46DBCCFCC}" destId="{9EE74A95-8647-476F-BAB3-76561FDCEEDC}" srcOrd="0" destOrd="0" presId="urn:microsoft.com/office/officeart/2005/8/layout/vList5"/>
-    <dgm:cxn modelId="{990B4541-4B2C-474C-B9E6-E42C9CFDB563}" srcId="{5F76C4F6-766D-4C8C-BA8D-A9A84ADA8CFA}" destId="{603AF13A-905A-4EFE-A6A8-8129D35421A3}" srcOrd="1" destOrd="0" parTransId="{5143639B-5D87-4F52-B4EF-B0D6B0D74290}" sibTransId="{2368AE8C-0000-46CE-8108-0CE4CFBD857C}"/>
-    <dgm:cxn modelId="{2B9A31CC-E2A4-4F38-AFDE-15067B1B43A1}" srcId="{E39146F7-1853-4C14-B2BF-91E46DBCCFCC}" destId="{E1C67297-1CD3-4D24-A1A1-431C2F9D014C}" srcOrd="1" destOrd="0" parTransId="{B24E4E1B-A611-410A-AE28-F8F224CC8BEB}" sibTransId="{5E05C776-3BA7-4BC7-B74B-25B2CCDDD107}"/>
-    <dgm:cxn modelId="{BDF6C4C1-FE4E-46E9-9E4D-0997F0CB067A}" type="presOf" srcId="{484745D3-9FFF-4410-8CCF-E22EE580497A}" destId="{E9F93019-D918-42D1-9CA7-B4549B367FC1}" srcOrd="0" destOrd="0" presId="urn:microsoft.com/office/officeart/2005/8/layout/vList5"/>
+    <dgm:cxn modelId="{ED552116-41C1-4E68-8FEE-066B43F59796}" type="presOf" srcId="{19CD8B9A-2146-4581-9EF6-F137FE214CDD}" destId="{52829FA7-E78A-4784-B296-26020144DB70}" srcOrd="0" destOrd="0" presId="urn:microsoft.com/office/officeart/2005/8/layout/vList5"/>
     <dgm:cxn modelId="{2C44A216-88D7-4648-BEDC-39AC9AE4340E}" type="presOf" srcId="{603AF13A-905A-4EFE-A6A8-8129D35421A3}" destId="{29B4C119-7922-4505-B68F-8CA0F9B2D1A8}" srcOrd="0" destOrd="1" presId="urn:microsoft.com/office/officeart/2005/8/layout/vList5"/>
+    <dgm:cxn modelId="{D8A22817-7E60-4A01-B18C-33E3DF3933D0}" type="presOf" srcId="{D5F52696-62A2-417A-9288-1FA53EB3431B}" destId="{29B4C119-7922-4505-B68F-8CA0F9B2D1A8}" srcOrd="0" destOrd="0" presId="urn:microsoft.com/office/officeart/2005/8/layout/vList5"/>
     <dgm:cxn modelId="{DF9BBA3E-7F08-4673-BF98-2FFBDB980DCC}" srcId="{E39146F7-1853-4C14-B2BF-91E46DBCCFCC}" destId="{5F76C4F6-766D-4C8C-BA8D-A9A84ADA8CFA}" srcOrd="3" destOrd="0" parTransId="{F9AA95DA-FF9E-4A7C-80E0-1081B6839CFE}" sibTransId="{257EB0F2-1184-4A32-8DD5-16D451F39332}"/>
     <dgm:cxn modelId="{2E3AD940-5890-4D79-B407-4E6D79FBAE0E}" type="presOf" srcId="{A2556B46-1D71-4BA9-A658-824CEAE335CA}" destId="{37143890-1B18-4E83-A8D8-2E79F91EC88F}" srcOrd="0" destOrd="0" presId="urn:microsoft.com/office/officeart/2005/8/layout/vList5"/>
+    <dgm:cxn modelId="{9043CE5B-EE25-4C63-82C0-1589E4A8A6A8}" type="presOf" srcId="{5785CB21-F3AC-44E3-ADF9-5D240BEFDE2F}" destId="{37143890-1B18-4E83-A8D8-2E79F91EC88F}" srcOrd="0" destOrd="1" presId="urn:microsoft.com/office/officeart/2005/8/layout/vList5"/>
+    <dgm:cxn modelId="{BB99535D-07FD-4DFF-9987-5B978DAF18F9}" srcId="{B70D2DD9-1895-4D57-AA6E-3C0612AEEA4A}" destId="{EFE8372C-C82E-45B8-A2EA-4C4B10EDB777}" srcOrd="0" destOrd="0" parTransId="{8D96D4AB-B9A7-4A59-8EC1-A1D3E75B50A3}" sibTransId="{D3E16F66-2523-4283-A9CF-781C68C6DAC7}"/>
+    <dgm:cxn modelId="{990B4541-4B2C-474C-B9E6-E42C9CFDB563}" srcId="{5F76C4F6-766D-4C8C-BA8D-A9A84ADA8CFA}" destId="{603AF13A-905A-4EFE-A6A8-8129D35421A3}" srcOrd="1" destOrd="0" parTransId="{5143639B-5D87-4F52-B4EF-B0D6B0D74290}" sibTransId="{2368AE8C-0000-46CE-8108-0CE4CFBD857C}"/>
+    <dgm:cxn modelId="{FA2C7642-62F5-4EA1-84EF-8994601B4F1F}" srcId="{E39146F7-1853-4C14-B2BF-91E46DBCCFCC}" destId="{484745D3-9FFF-4410-8CCF-E22EE580497A}" srcOrd="4" destOrd="0" parTransId="{D01E8811-8FFE-4D18-8662-3FB00DDBABC3}" sibTransId="{B06EB237-E4A4-44A6-A37B-7458D6F4EECF}"/>
+    <dgm:cxn modelId="{E00F8562-C288-4C7C-A890-E9121314A421}" srcId="{E1C67297-1CD3-4D24-A1A1-431C2F9D014C}" destId="{5785CB21-F3AC-44E3-ADF9-5D240BEFDE2F}" srcOrd="1" destOrd="0" parTransId="{D77605B1-0B5A-4FC4-8569-914F549B0D90}" sibTransId="{33496A6B-1A42-4EDE-B16F-DBD0DDD8156B}"/>
+    <dgm:cxn modelId="{582E9F45-4857-40C4-A0AB-422A87EE178A}" srcId="{484745D3-9FFF-4410-8CCF-E22EE580497A}" destId="{7F2AAD7D-3E1D-408D-AA83-CFC8EDFA0FAE}" srcOrd="0" destOrd="0" parTransId="{80750E1E-B191-4ADB-986F-F7C06AE205CB}" sibTransId="{4D09D464-8F14-48A2-9CE4-52BE95501310}"/>
+    <dgm:cxn modelId="{22FD756C-9D82-4943-830B-E5E3ABDB10AB}" type="presOf" srcId="{5F76C4F6-766D-4C8C-BA8D-A9A84ADA8CFA}" destId="{CF59BC44-78AC-4502-A343-3B1021116F46}" srcOrd="0" destOrd="0" presId="urn:microsoft.com/office/officeart/2005/8/layout/vList5"/>
+    <dgm:cxn modelId="{791CC572-60F1-409E-9008-749CA7E2E274}" srcId="{5F76C4F6-766D-4C8C-BA8D-A9A84ADA8CFA}" destId="{D5F52696-62A2-417A-9288-1FA53EB3431B}" srcOrd="0" destOrd="0" parTransId="{EBA042AC-3B71-44D0-9657-026A86551654}" sibTransId="{47E37315-A3C9-441D-91A0-C65CFEB51070}"/>
+    <dgm:cxn modelId="{2DF1EC7F-25F3-4E50-9F2B-6F14A5CD2D42}" type="presOf" srcId="{7F2AAD7D-3E1D-408D-AA83-CFC8EDFA0FAE}" destId="{1AF74E43-2C09-4698-B017-7B2C06C58F81}" srcOrd="0" destOrd="0" presId="urn:microsoft.com/office/officeart/2005/8/layout/vList5"/>
+    <dgm:cxn modelId="{48AF2481-C28E-48F1-975B-D2CC03B9B9EB}" type="presOf" srcId="{B70D2DD9-1895-4D57-AA6E-3C0612AEEA4A}" destId="{FEA8F47D-E737-4285-AB37-20BF6964D724}" srcOrd="0" destOrd="0" presId="urn:microsoft.com/office/officeart/2005/8/layout/vList5"/>
+    <dgm:cxn modelId="{F27ECE83-7548-4CF9-B61F-0E38115A8AC3}" srcId="{19CD8B9A-2146-4581-9EF6-F137FE214CDD}" destId="{D759A546-3441-4B67-B1A7-BC5779A425EC}" srcOrd="0" destOrd="0" parTransId="{D47DDE11-2FE4-4224-8D86-77AA990969A1}" sibTransId="{7980A993-88CC-41EF-B014-E104FE39230F}"/>
+    <dgm:cxn modelId="{92D6BF87-3E43-4E35-BD18-C4A0F1FEDDAB}" srcId="{B70D2DD9-1895-4D57-AA6E-3C0612AEEA4A}" destId="{F8521A01-321F-40CB-A613-A0C05B26B553}" srcOrd="1" destOrd="0" parTransId="{7030C4DA-0CC1-46EC-8783-72274A4A7774}" sibTransId="{0DBE9699-7567-4B22-B7DA-C14CD03CC481}"/>
+    <dgm:cxn modelId="{DAE3DC8B-2F73-4B5F-8F5D-DEDFFDF6A00B}" type="presOf" srcId="{EFE8372C-C82E-45B8-A2EA-4C4B10EDB777}" destId="{DB833F3B-AD51-4576-A22F-30F7EDD83719}" srcOrd="0" destOrd="0" presId="urn:microsoft.com/office/officeart/2005/8/layout/vList5"/>
+    <dgm:cxn modelId="{25636A8F-3549-409A-8FDB-28BE4590E8A5}" srcId="{E39146F7-1853-4C14-B2BF-91E46DBCCFCC}" destId="{19CD8B9A-2146-4581-9EF6-F137FE214CDD}" srcOrd="2" destOrd="0" parTransId="{1F8B62C5-5D37-4F80-AF1A-2F99DF7029BE}" sibTransId="{479E4232-F2DA-49B2-BB05-B1057E11F4B9}"/>
     <dgm:cxn modelId="{7B0DE691-0835-4BC5-926A-1F45EB96D1D2}" srcId="{19CD8B9A-2146-4581-9EF6-F137FE214CDD}" destId="{4BF748E8-C37B-4D9D-99DB-3BB6EB7D3B28}" srcOrd="1" destOrd="0" parTransId="{D0FAF37E-9553-44D7-8BE2-1914142C164E}" sibTransId="{CCF9273C-F040-4C70-A482-00BE41D9056D}"/>
+    <dgm:cxn modelId="{88917C98-E7DA-45CA-AB18-0D44A8EAF6AF}" type="presOf" srcId="{4BF748E8-C37B-4D9D-99DB-3BB6EB7D3B28}" destId="{4D3CABE8-8E1D-4B01-8A9A-9E6A3179EAF0}" srcOrd="0" destOrd="1" presId="urn:microsoft.com/office/officeart/2005/8/layout/vList5"/>
+    <dgm:cxn modelId="{B78704A3-0559-4D27-91A9-65E40B16F214}" type="presOf" srcId="{F8521A01-321F-40CB-A613-A0C05B26B553}" destId="{DB833F3B-AD51-4576-A22F-30F7EDD83719}" srcOrd="0" destOrd="1" presId="urn:microsoft.com/office/officeart/2005/8/layout/vList5"/>
+    <dgm:cxn modelId="{F9F4D3B2-C6E0-42DD-92D7-73A4FA607C4D}" srcId="{E1C67297-1CD3-4D24-A1A1-431C2F9D014C}" destId="{A2556B46-1D71-4BA9-A658-824CEAE335CA}" srcOrd="0" destOrd="0" parTransId="{B4815891-554E-4B3E-B5EF-B44A2C7EAE09}" sibTransId="{E5AABB46-7550-4223-AE4D-34F79017D72A}"/>
+    <dgm:cxn modelId="{4F9E74B8-662A-454F-BA28-787660186D5E}" srcId="{E39146F7-1853-4C14-B2BF-91E46DBCCFCC}" destId="{B70D2DD9-1895-4D57-AA6E-3C0612AEEA4A}" srcOrd="0" destOrd="0" parTransId="{DC777B81-5EAF-4686-A350-06E9868E5B25}" sibTransId="{55A3A7DE-9C4E-41F5-A18E-1E98631E092F}"/>
     <dgm:cxn modelId="{DBFD07BB-A73B-4D2B-9714-BCBD6BD80D7A}" srcId="{484745D3-9FFF-4410-8CCF-E22EE580497A}" destId="{8350ED0B-F751-4169-99B6-7F1A164FB706}" srcOrd="1" destOrd="0" parTransId="{1B29E50A-D080-43AB-9DE4-F368C9FA9617}" sibTransId="{BF864B8F-9C9F-4040-B8F7-C34E5C520561}"/>
-    <dgm:cxn modelId="{88917C98-E7DA-45CA-AB18-0D44A8EAF6AF}" type="presOf" srcId="{4BF748E8-C37B-4D9D-99DB-3BB6EB7D3B28}" destId="{4D3CABE8-8E1D-4B01-8A9A-9E6A3179EAF0}" srcOrd="0" destOrd="1" presId="urn:microsoft.com/office/officeart/2005/8/layout/vList5"/>
-    <dgm:cxn modelId="{FA2C7642-62F5-4EA1-84EF-8994601B4F1F}" srcId="{E39146F7-1853-4C14-B2BF-91E46DBCCFCC}" destId="{484745D3-9FFF-4410-8CCF-E22EE580497A}" srcOrd="4" destOrd="0" parTransId="{D01E8811-8FFE-4D18-8662-3FB00DDBABC3}" sibTransId="{B06EB237-E4A4-44A6-A37B-7458D6F4EECF}"/>
-    <dgm:cxn modelId="{ED552116-41C1-4E68-8FEE-066B43F59796}" type="presOf" srcId="{19CD8B9A-2146-4581-9EF6-F137FE214CDD}" destId="{52829FA7-E78A-4784-B296-26020144DB70}" srcOrd="0" destOrd="0" presId="urn:microsoft.com/office/officeart/2005/8/layout/vList5"/>
-    <dgm:cxn modelId="{9043CE5B-EE25-4C63-82C0-1589E4A8A6A8}" type="presOf" srcId="{5785CB21-F3AC-44E3-ADF9-5D240BEFDE2F}" destId="{37143890-1B18-4E83-A8D8-2E79F91EC88F}" srcOrd="0" destOrd="1" presId="urn:microsoft.com/office/officeart/2005/8/layout/vList5"/>
-    <dgm:cxn modelId="{E00F8562-C288-4C7C-A890-E9121314A421}" srcId="{E1C67297-1CD3-4D24-A1A1-431C2F9D014C}" destId="{5785CB21-F3AC-44E3-ADF9-5D240BEFDE2F}" srcOrd="1" destOrd="0" parTransId="{D77605B1-0B5A-4FC4-8569-914F549B0D90}" sibTransId="{33496A6B-1A42-4EDE-B16F-DBD0DDD8156B}"/>
+    <dgm:cxn modelId="{4DDA1BBE-4C6C-4530-9C47-5858347829A1}" type="presOf" srcId="{E39146F7-1853-4C14-B2BF-91E46DBCCFCC}" destId="{9EE74A95-8647-476F-BAB3-76561FDCEEDC}" srcOrd="0" destOrd="0" presId="urn:microsoft.com/office/officeart/2005/8/layout/vList5"/>
+    <dgm:cxn modelId="{BDF6C4C1-FE4E-46E9-9E4D-0997F0CB067A}" type="presOf" srcId="{484745D3-9FFF-4410-8CCF-E22EE580497A}" destId="{E9F93019-D918-42D1-9CA7-B4549B367FC1}" srcOrd="0" destOrd="0" presId="urn:microsoft.com/office/officeart/2005/8/layout/vList5"/>
     <dgm:cxn modelId="{459565C3-B355-4BFA-A46A-218D516AFCD3}" type="presOf" srcId="{8350ED0B-F751-4169-99B6-7F1A164FB706}" destId="{1AF74E43-2C09-4698-B017-7B2C06C58F81}" srcOrd="0" destOrd="1" presId="urn:microsoft.com/office/officeart/2005/8/layout/vList5"/>
-    <dgm:cxn modelId="{F27ECE83-7548-4CF9-B61F-0E38115A8AC3}" srcId="{19CD8B9A-2146-4581-9EF6-F137FE214CDD}" destId="{D759A546-3441-4B67-B1A7-BC5779A425EC}" srcOrd="0" destOrd="0" parTransId="{D47DDE11-2FE4-4224-8D86-77AA990969A1}" sibTransId="{7980A993-88CC-41EF-B014-E104FE39230F}"/>
-    <dgm:cxn modelId="{25636A8F-3549-409A-8FDB-28BE4590E8A5}" srcId="{E39146F7-1853-4C14-B2BF-91E46DBCCFCC}" destId="{19CD8B9A-2146-4581-9EF6-F137FE214CDD}" srcOrd="2" destOrd="0" parTransId="{1F8B62C5-5D37-4F80-AF1A-2F99DF7029BE}" sibTransId="{479E4232-F2DA-49B2-BB05-B1057E11F4B9}"/>
-    <dgm:cxn modelId="{2DF1EC7F-25F3-4E50-9F2B-6F14A5CD2D42}" type="presOf" srcId="{7F2AAD7D-3E1D-408D-AA83-CFC8EDFA0FAE}" destId="{1AF74E43-2C09-4698-B017-7B2C06C58F81}" srcOrd="0" destOrd="0" presId="urn:microsoft.com/office/officeart/2005/8/layout/vList5"/>
-    <dgm:cxn modelId="{BB99535D-07FD-4DFF-9987-5B978DAF18F9}" srcId="{B70D2DD9-1895-4D57-AA6E-3C0612AEEA4A}" destId="{EFE8372C-C82E-45B8-A2EA-4C4B10EDB777}" srcOrd="0" destOrd="0" parTransId="{8D96D4AB-B9A7-4A59-8EC1-A1D3E75B50A3}" sibTransId="{D3E16F66-2523-4283-A9CF-781C68C6DAC7}"/>
-    <dgm:cxn modelId="{48AF2481-C28E-48F1-975B-D2CC03B9B9EB}" type="presOf" srcId="{B70D2DD9-1895-4D57-AA6E-3C0612AEEA4A}" destId="{FEA8F47D-E737-4285-AB37-20BF6964D724}" srcOrd="0" destOrd="0" presId="urn:microsoft.com/office/officeart/2005/8/layout/vList5"/>
-    <dgm:cxn modelId="{22FD756C-9D82-4943-830B-E5E3ABDB10AB}" type="presOf" srcId="{5F76C4F6-766D-4C8C-BA8D-A9A84ADA8CFA}" destId="{CF59BC44-78AC-4502-A343-3B1021116F46}" srcOrd="0" destOrd="0" presId="urn:microsoft.com/office/officeart/2005/8/layout/vList5"/>
-    <dgm:cxn modelId="{D8A22817-7E60-4A01-B18C-33E3DF3933D0}" type="presOf" srcId="{D5F52696-62A2-417A-9288-1FA53EB3431B}" destId="{29B4C119-7922-4505-B68F-8CA0F9B2D1A8}" srcOrd="0" destOrd="0" presId="urn:microsoft.com/office/officeart/2005/8/layout/vList5"/>
-    <dgm:cxn modelId="{DAE3DC8B-2F73-4B5F-8F5D-DEDFFDF6A00B}" type="presOf" srcId="{EFE8372C-C82E-45B8-A2EA-4C4B10EDB777}" destId="{DB833F3B-AD51-4576-A22F-30F7EDD83719}" srcOrd="0" destOrd="0" presId="urn:microsoft.com/office/officeart/2005/8/layout/vList5"/>
-    <dgm:cxn modelId="{92D6BF87-3E43-4E35-BD18-C4A0F1FEDDAB}" srcId="{B70D2DD9-1895-4D57-AA6E-3C0612AEEA4A}" destId="{F8521A01-321F-40CB-A613-A0C05B26B553}" srcOrd="1" destOrd="0" parTransId="{7030C4DA-0CC1-46EC-8783-72274A4A7774}" sibTransId="{0DBE9699-7567-4B22-B7DA-C14CD03CC481}"/>
-    <dgm:cxn modelId="{B78704A3-0559-4D27-91A9-65E40B16F214}" type="presOf" srcId="{F8521A01-321F-40CB-A613-A0C05B26B553}" destId="{DB833F3B-AD51-4576-A22F-30F7EDD83719}" srcOrd="0" destOrd="1" presId="urn:microsoft.com/office/officeart/2005/8/layout/vList5"/>
+    <dgm:cxn modelId="{2B9A31CC-E2A4-4F38-AFDE-15067B1B43A1}" srcId="{E39146F7-1853-4C14-B2BF-91E46DBCCFCC}" destId="{E1C67297-1CD3-4D24-A1A1-431C2F9D014C}" srcOrd="1" destOrd="0" parTransId="{B24E4E1B-A611-410A-AE28-F8F224CC8BEB}" sibTransId="{5E05C776-3BA7-4BC7-B74B-25B2CCDDD107}"/>
     <dgm:cxn modelId="{29ECA0FD-8304-405C-A446-ACD9C20D9D85}" type="presOf" srcId="{E1C67297-1CD3-4D24-A1A1-431C2F9D014C}" destId="{100EFBF7-0860-40A9-9444-6C5FB630C37E}" srcOrd="0" destOrd="0" presId="urn:microsoft.com/office/officeart/2005/8/layout/vList5"/>
-    <dgm:cxn modelId="{791CC572-60F1-409E-9008-749CA7E2E274}" srcId="{5F76C4F6-766D-4C8C-BA8D-A9A84ADA8CFA}" destId="{D5F52696-62A2-417A-9288-1FA53EB3431B}" srcOrd="0" destOrd="0" parTransId="{EBA042AC-3B71-44D0-9657-026A86551654}" sibTransId="{47E37315-A3C9-441D-91A0-C65CFEB51070}"/>
     <dgm:cxn modelId="{08B6EE45-0349-4782-AD20-39EEB7B290FA}" type="presParOf" srcId="{9EE74A95-8647-476F-BAB3-76561FDCEEDC}" destId="{01284A1E-F536-4B5D-88A8-CBDBC739F037}" srcOrd="0" destOrd="0" presId="urn:microsoft.com/office/officeart/2005/8/layout/vList5"/>
     <dgm:cxn modelId="{B4B655FA-2B0C-4127-A599-626E655EC486}" type="presParOf" srcId="{01284A1E-F536-4B5D-88A8-CBDBC739F037}" destId="{FEA8F47D-E737-4285-AB37-20BF6964D724}" srcOrd="0" destOrd="0" presId="urn:microsoft.com/office/officeart/2005/8/layout/vList5"/>
     <dgm:cxn modelId="{751AE544-9E29-4C04-9D7C-E9C8FA48D048}" type="presParOf" srcId="{01284A1E-F536-4B5D-88A8-CBDBC739F037}" destId="{DB833F3B-AD51-4576-A22F-30F7EDD83719}" srcOrd="1" destOrd="0" presId="urn:microsoft.com/office/officeart/2005/8/layout/vList5"/>
@@ -4860,13 +4759,6 @@
         </dgm:presLayoutVars>
       </dgm:prSet>
       <dgm:spPr/>
-      <dgm:t>
-        <a:bodyPr/>
-        <a:lstStyle/>
-        <a:p>
-          <a:endParaRPr lang="en-GB"/>
-        </a:p>
-      </dgm:t>
     </dgm:pt>
     <dgm:pt modelId="{3D951C67-6A73-4DEA-9DD2-D7153CFDFDEE}" type="pres">
       <dgm:prSet presAssocID="{1C8E9815-AE6D-496D-A735-87CBA79964EA}" presName="linNode" presStyleCnt="0"/>
@@ -4880,13 +4772,6 @@
         </dgm:presLayoutVars>
       </dgm:prSet>
       <dgm:spPr/>
-      <dgm:t>
-        <a:bodyPr/>
-        <a:lstStyle/>
-        <a:p>
-          <a:endParaRPr lang="en-GB"/>
-        </a:p>
-      </dgm:t>
     </dgm:pt>
     <dgm:pt modelId="{3B6DE39D-AA0F-49E9-98F3-259607EB6E8A}" type="pres">
       <dgm:prSet presAssocID="{1C8E9815-AE6D-496D-A735-87CBA79964EA}" presName="bracket" presStyleLbl="parChTrans1D1" presStyleIdx="0" presStyleCnt="5"/>
@@ -4903,13 +4788,6 @@
         </dgm:presLayoutVars>
       </dgm:prSet>
       <dgm:spPr/>
-      <dgm:t>
-        <a:bodyPr/>
-        <a:lstStyle/>
-        <a:p>
-          <a:endParaRPr lang="en-GB"/>
-        </a:p>
-      </dgm:t>
     </dgm:pt>
     <dgm:pt modelId="{C67547A3-AED1-4D27-B430-CF621B56343F}" type="pres">
       <dgm:prSet presAssocID="{43B88CF8-B095-4A9C-8A37-279ACBC7ED3E}" presName="spV" presStyleCnt="0"/>
@@ -4927,13 +4805,6 @@
         </dgm:presLayoutVars>
       </dgm:prSet>
       <dgm:spPr/>
-      <dgm:t>
-        <a:bodyPr/>
-        <a:lstStyle/>
-        <a:p>
-          <a:endParaRPr lang="en-GB"/>
-        </a:p>
-      </dgm:t>
     </dgm:pt>
     <dgm:pt modelId="{942AAD63-E67C-4A18-81D9-A468408DB75E}" type="pres">
       <dgm:prSet presAssocID="{91D0EB76-F6A9-4BEE-9D16-8DA43E52546D}" presName="bracket" presStyleLbl="parChTrans1D1" presStyleIdx="1" presStyleCnt="5"/>
@@ -4950,13 +4821,6 @@
         </dgm:presLayoutVars>
       </dgm:prSet>
       <dgm:spPr/>
-      <dgm:t>
-        <a:bodyPr/>
-        <a:lstStyle/>
-        <a:p>
-          <a:endParaRPr lang="en-GB"/>
-        </a:p>
-      </dgm:t>
     </dgm:pt>
     <dgm:pt modelId="{915B3D77-6B9A-4439-B19F-76C819AA523F}" type="pres">
       <dgm:prSet presAssocID="{A92C918E-D55A-455B-B912-45E99CE43753}" presName="spV" presStyleCnt="0"/>
@@ -4974,13 +4838,6 @@
         </dgm:presLayoutVars>
       </dgm:prSet>
       <dgm:spPr/>
-      <dgm:t>
-        <a:bodyPr/>
-        <a:lstStyle/>
-        <a:p>
-          <a:endParaRPr lang="en-GB"/>
-        </a:p>
-      </dgm:t>
     </dgm:pt>
     <dgm:pt modelId="{0D533747-B980-498A-9E09-179A06E92DCE}" type="pres">
       <dgm:prSet presAssocID="{E61B1C18-0BF1-4FB5-AE84-A8D20D8BB814}" presName="bracket" presStyleLbl="parChTrans1D1" presStyleIdx="2" presStyleCnt="5"/>
@@ -4997,13 +4854,6 @@
         </dgm:presLayoutVars>
       </dgm:prSet>
       <dgm:spPr/>
-      <dgm:t>
-        <a:bodyPr/>
-        <a:lstStyle/>
-        <a:p>
-          <a:endParaRPr lang="en-GB"/>
-        </a:p>
-      </dgm:t>
     </dgm:pt>
     <dgm:pt modelId="{D1607EA0-29E4-43C4-97A2-34B7531F5670}" type="pres">
       <dgm:prSet presAssocID="{98A03895-C1BB-4195-864A-5486CCC34EE7}" presName="spV" presStyleCnt="0"/>
@@ -5021,13 +4871,6 @@
         </dgm:presLayoutVars>
       </dgm:prSet>
       <dgm:spPr/>
-      <dgm:t>
-        <a:bodyPr/>
-        <a:lstStyle/>
-        <a:p>
-          <a:endParaRPr lang="en-GB"/>
-        </a:p>
-      </dgm:t>
     </dgm:pt>
     <dgm:pt modelId="{69D7D4D9-5754-4AFB-8F8A-90ECCD7A82A9}" type="pres">
       <dgm:prSet presAssocID="{C06AC3F6-9C8A-4537-8716-7D1E01D69A22}" presName="bracket" presStyleLbl="parChTrans1D1" presStyleIdx="3" presStyleCnt="5"/>
@@ -5044,13 +4887,6 @@
         </dgm:presLayoutVars>
       </dgm:prSet>
       <dgm:spPr/>
-      <dgm:t>
-        <a:bodyPr/>
-        <a:lstStyle/>
-        <a:p>
-          <a:endParaRPr lang="en-GB"/>
-        </a:p>
-      </dgm:t>
     </dgm:pt>
     <dgm:pt modelId="{8496564C-5B9F-4083-9B80-FB960E38B6AA}" type="pres">
       <dgm:prSet presAssocID="{1E7AD02D-7A32-41FD-A49C-79587D51E495}" presName="spV" presStyleCnt="0"/>
@@ -5068,13 +4904,6 @@
         </dgm:presLayoutVars>
       </dgm:prSet>
       <dgm:spPr/>
-      <dgm:t>
-        <a:bodyPr/>
-        <a:lstStyle/>
-        <a:p>
-          <a:endParaRPr lang="en-GB"/>
-        </a:p>
-      </dgm:t>
     </dgm:pt>
     <dgm:pt modelId="{9DB501DE-5406-4B33-9E66-BDFF96B2FEA1}" type="pres">
       <dgm:prSet presAssocID="{01CD7B7E-2963-42DD-830A-40869D9DC10D}" presName="bracket" presStyleLbl="parChTrans1D1" presStyleIdx="4" presStyleCnt="5"/>
@@ -5091,47 +4920,40 @@
         </dgm:presLayoutVars>
       </dgm:prSet>
       <dgm:spPr/>
-      <dgm:t>
-        <a:bodyPr/>
-        <a:lstStyle/>
-        <a:p>
-          <a:endParaRPr lang="en-GB"/>
-        </a:p>
-      </dgm:t>
     </dgm:pt>
   </dgm:ptLst>
   <dgm:cxnLst>
+    <dgm:cxn modelId="{E976EA01-693D-4291-8FB1-9F80923F866E}" type="presOf" srcId="{01CD7B7E-2963-42DD-830A-40869D9DC10D}" destId="{A9DDCD47-19B7-449F-8E6F-04A01F49980F}" srcOrd="0" destOrd="0" presId="urn:diagrams.loki3.com/BracketList"/>
+    <dgm:cxn modelId="{0879D504-44E8-40AD-AAB0-E707306A1F69}" type="presOf" srcId="{C06AC3F6-9C8A-4537-8716-7D1E01D69A22}" destId="{586EB7D3-FDA4-473A-9871-AA960A7336FD}" srcOrd="0" destOrd="0" presId="urn:diagrams.loki3.com/BracketList"/>
+    <dgm:cxn modelId="{FED6E513-1A96-4942-A65D-9B979C8CE41B}" srcId="{1C8E9815-AE6D-496D-A735-87CBA79964EA}" destId="{E345950A-B289-46B9-AE71-F4FD36752FD9}" srcOrd="1" destOrd="0" parTransId="{8EFD0B75-AD06-42B0-8D35-A60D79FC3BF7}" sibTransId="{8932E850-9A68-4570-B3E8-5822C7EFB70D}"/>
+    <dgm:cxn modelId="{BBB78E14-4CAF-4AFA-B9F3-69B3DF38A133}" srcId="{C971C89A-9A94-4551-B102-2C432965F17D}" destId="{91D0EB76-F6A9-4BEE-9D16-8DA43E52546D}" srcOrd="1" destOrd="0" parTransId="{6286C36D-FC46-4524-9067-AAE5F84B8635}" sibTransId="{A92C918E-D55A-455B-B912-45E99CE43753}"/>
+    <dgm:cxn modelId="{E7D6EF1B-D7B0-46E6-B7BE-1373B8F8CE7C}" type="presOf" srcId="{0FF9AD06-06E8-47A0-A8CC-3EF3B3FDAFD2}" destId="{21498668-43E3-41E3-8FF6-C2B71F9AE46B}" srcOrd="0" destOrd="0" presId="urn:diagrams.loki3.com/BracketList"/>
+    <dgm:cxn modelId="{5043171C-500F-43B2-9056-B2A2B61290EB}" type="presOf" srcId="{D3EA8E8C-7AA2-44C3-827B-1021A79F427E}" destId="{21498668-43E3-41E3-8FF6-C2B71F9AE46B}" srcOrd="0" destOrd="1" presId="urn:diagrams.loki3.com/BracketList"/>
+    <dgm:cxn modelId="{ED749A21-A90F-48E6-8E0C-DF8719A99EA9}" type="presOf" srcId="{5CEA56EB-9454-4960-A990-EEF1533B300E}" destId="{398CB2CD-779C-49F2-8BFB-080731C053C4}" srcOrd="0" destOrd="0" presId="urn:diagrams.loki3.com/BracketList"/>
+    <dgm:cxn modelId="{28C48724-9D0D-4163-AD36-EC7D92688DE6}" type="presOf" srcId="{AE3C2586-E145-40B9-A992-EAED99AEC4D6}" destId="{02457115-F5E5-4F1A-BBCC-CDB7F5A10EC8}" srcOrd="0" destOrd="0" presId="urn:diagrams.loki3.com/BracketList"/>
+    <dgm:cxn modelId="{D7E39239-E9FB-4813-AF2B-47CABCB28E8B}" srcId="{C06AC3F6-9C8A-4537-8716-7D1E01D69A22}" destId="{BD5C6C27-4E10-4A10-BAFC-DB6FA94311C9}" srcOrd="1" destOrd="0" parTransId="{E11D6736-FCD7-4FCE-B5EA-CCACEAB3FCBD}" sibTransId="{A4CF830A-0EC8-40F4-9824-53E8EA5CB210}"/>
+    <dgm:cxn modelId="{0C0C895C-C7E4-4C74-B949-254A9ABAC2AF}" srcId="{C971C89A-9A94-4551-B102-2C432965F17D}" destId="{C06AC3F6-9C8A-4537-8716-7D1E01D69A22}" srcOrd="3" destOrd="0" parTransId="{3AB7139D-662E-4855-ACC5-260395550E37}" sibTransId="{1E7AD02D-7A32-41FD-A49C-79587D51E495}"/>
+    <dgm:cxn modelId="{D968835E-D4CA-421C-B246-1FBDABDE5F40}" srcId="{E61B1C18-0BF1-4FB5-AE84-A8D20D8BB814}" destId="{164E8698-AFAF-4CB2-B4F3-998C20BC454A}" srcOrd="1" destOrd="0" parTransId="{904320E9-9D4F-423E-BAC0-C2D12F01B24A}" sibTransId="{3400E59D-175C-40F7-B62D-25347A2DA855}"/>
+    <dgm:cxn modelId="{28B56941-8F31-4021-B7DC-9157A97CAB48}" srcId="{91D0EB76-F6A9-4BEE-9D16-8DA43E52546D}" destId="{CB3DF28C-448D-4C63-9418-3265BDDDC3E1}" srcOrd="0" destOrd="0" parTransId="{EF261564-70E3-4D7D-BAD0-0E38770BC784}" sibTransId="{16A16E68-8BAF-48BA-8EF9-0ACC92334016}"/>
+    <dgm:cxn modelId="{DE528766-77B6-4C98-9EFD-CF2557B2D25E}" type="presOf" srcId="{C971C89A-9A94-4551-B102-2C432965F17D}" destId="{266E1F04-00A6-4F70-82C2-6885CB3891F7}" srcOrd="0" destOrd="0" presId="urn:diagrams.loki3.com/BracketList"/>
+    <dgm:cxn modelId="{EC32E268-B68C-429E-8164-FCADB9EADC5B}" srcId="{E61B1C18-0BF1-4FB5-AE84-A8D20D8BB814}" destId="{5CEA56EB-9454-4960-A990-EEF1533B300E}" srcOrd="0" destOrd="0" parTransId="{C2D1F64C-06B2-4804-BC75-DA5EB95D68EB}" sibTransId="{2D1C0280-F6B5-42F2-9343-2C16CF5DCAC2}"/>
+    <dgm:cxn modelId="{DC6C456A-EC3A-469E-A292-A2023706545E}" type="presOf" srcId="{E345950A-B289-46B9-AE71-F4FD36752FD9}" destId="{02457115-F5E5-4F1A-BBCC-CDB7F5A10EC8}" srcOrd="0" destOrd="1" presId="urn:diagrams.loki3.com/BracketList"/>
+    <dgm:cxn modelId="{53A7DF4F-2423-4D32-B0D8-4BAA83D495CB}" type="presOf" srcId="{BD5C6C27-4E10-4A10-BAFC-DB6FA94311C9}" destId="{427277C7-FC4F-4231-9C3F-920C3815A9E5}" srcOrd="0" destOrd="1" presId="urn:diagrams.loki3.com/BracketList"/>
+    <dgm:cxn modelId="{FFE7F458-A350-49FE-8616-0FAAE89D669C}" srcId="{01CD7B7E-2963-42DD-830A-40869D9DC10D}" destId="{0FF9AD06-06E8-47A0-A8CC-3EF3B3FDAFD2}" srcOrd="0" destOrd="0" parTransId="{79E0C327-A854-4DC8-96D3-56754D16A66F}" sibTransId="{1815DD62-97B8-40EF-AF59-D54F015E28A6}"/>
+    <dgm:cxn modelId="{FEA4FD7B-9DBD-4824-AC5A-4860C082D3F6}" type="presOf" srcId="{91D0EB76-F6A9-4BEE-9D16-8DA43E52546D}" destId="{3A077590-EFBB-40E2-B1A8-C4C700B019BE}" srcOrd="0" destOrd="0" presId="urn:diagrams.loki3.com/BracketList"/>
+    <dgm:cxn modelId="{7EF461A3-B6F8-4F6B-97C8-92E09B57DE53}" type="presOf" srcId="{164E8698-AFAF-4CB2-B4F3-998C20BC454A}" destId="{398CB2CD-779C-49F2-8BFB-080731C053C4}" srcOrd="0" destOrd="1" presId="urn:diagrams.loki3.com/BracketList"/>
+    <dgm:cxn modelId="{8B9D6DA6-88A4-46E3-B80F-67F87100962C}" srcId="{C971C89A-9A94-4551-B102-2C432965F17D}" destId="{01CD7B7E-2963-42DD-830A-40869D9DC10D}" srcOrd="4" destOrd="0" parTransId="{728C3420-F075-49C5-9C10-56A81EC5A2DA}" sibTransId="{D9D951CE-8F4B-45EB-AAC7-F2007504AB0E}"/>
+    <dgm:cxn modelId="{B933AAA6-4EA3-4B91-84B9-1AFAD70EC433}" srcId="{C971C89A-9A94-4551-B102-2C432965F17D}" destId="{1C8E9815-AE6D-496D-A735-87CBA79964EA}" srcOrd="0" destOrd="0" parTransId="{2B6CDF61-E902-4664-9F91-3305D63716E1}" sibTransId="{43B88CF8-B095-4A9C-8A37-279ACBC7ED3E}"/>
+    <dgm:cxn modelId="{9207E6B2-EE00-481D-AC6F-80F1D5831275}" srcId="{01CD7B7E-2963-42DD-830A-40869D9DC10D}" destId="{D3EA8E8C-7AA2-44C3-827B-1021A79F427E}" srcOrd="1" destOrd="0" parTransId="{B1FAE5BF-6995-4641-85B2-9BB59C934C8A}" sibTransId="{7A5D70D5-B7D0-40A8-B427-07D00EE0BBDA}"/>
+    <dgm:cxn modelId="{CAF582BC-D00C-4E5B-8618-DC5F1F7031E7}" srcId="{91D0EB76-F6A9-4BEE-9D16-8DA43E52546D}" destId="{9AD3CE5F-F11B-465C-A987-72C34871B54E}" srcOrd="1" destOrd="0" parTransId="{804E7FB5-C401-4418-BD63-DE1136CAC019}" sibTransId="{92FB8E84-AABD-4F83-AECE-E0CA5271C755}"/>
+    <dgm:cxn modelId="{49BF8DBC-311C-4FE8-BBC2-D02B4C2EF236}" type="presOf" srcId="{1C8E9815-AE6D-496D-A735-87CBA79964EA}" destId="{F81F2571-3068-41FC-9522-0E7D25B49BBE}" srcOrd="0" destOrd="0" presId="urn:diagrams.loki3.com/BracketList"/>
+    <dgm:cxn modelId="{CB2028BF-DA15-48AE-B400-7B0F43D50C81}" type="presOf" srcId="{CB3DF28C-448D-4C63-9418-3265BDDDC3E1}" destId="{B27D6E9B-39F6-404E-948D-C2CE04A7CAC1}" srcOrd="0" destOrd="0" presId="urn:diagrams.loki3.com/BracketList"/>
+    <dgm:cxn modelId="{2C4C9DC7-F204-4C99-828A-989C202C330E}" type="presOf" srcId="{9AD3CE5F-F11B-465C-A987-72C34871B54E}" destId="{B27D6E9B-39F6-404E-948D-C2CE04A7CAC1}" srcOrd="0" destOrd="1" presId="urn:diagrams.loki3.com/BracketList"/>
+    <dgm:cxn modelId="{8241C7D5-07FA-4C53-8075-D6E625712363}" type="presOf" srcId="{0C527BBD-610B-4C85-B280-A6F0A00C7A05}" destId="{427277C7-FC4F-4231-9C3F-920C3815A9E5}" srcOrd="0" destOrd="0" presId="urn:diagrams.loki3.com/BracketList"/>
+    <dgm:cxn modelId="{21408CD6-0B0A-41F3-B6A3-AFC2F14EA227}" srcId="{1C8E9815-AE6D-496D-A735-87CBA79964EA}" destId="{AE3C2586-E145-40B9-A992-EAED99AEC4D6}" srcOrd="0" destOrd="0" parTransId="{6BA9DE15-F13C-4A36-8C0A-03796FEDF8D9}" sibTransId="{E8BE0BCD-AE07-4AD9-9699-76C01CC669D7}"/>
     <dgm:cxn modelId="{DAED6FE8-B416-4C64-8C3B-62298C8EA27E}" srcId="{C06AC3F6-9C8A-4537-8716-7D1E01D69A22}" destId="{0C527BBD-610B-4C85-B280-A6F0A00C7A05}" srcOrd="0" destOrd="0" parTransId="{1DA166E0-C3CD-481F-94D4-B98DA71C1246}" sibTransId="{FC3358AD-C4AD-4658-BA01-C6A9A0CF77FB}"/>
-    <dgm:cxn modelId="{D7E39239-E9FB-4813-AF2B-47CABCB28E8B}" srcId="{C06AC3F6-9C8A-4537-8716-7D1E01D69A22}" destId="{BD5C6C27-4E10-4A10-BAFC-DB6FA94311C9}" srcOrd="1" destOrd="0" parTransId="{E11D6736-FCD7-4FCE-B5EA-CCACEAB3FCBD}" sibTransId="{A4CF830A-0EC8-40F4-9824-53E8EA5CB210}"/>
-    <dgm:cxn modelId="{53A7DF4F-2423-4D32-B0D8-4BAA83D495CB}" type="presOf" srcId="{BD5C6C27-4E10-4A10-BAFC-DB6FA94311C9}" destId="{427277C7-FC4F-4231-9C3F-920C3815A9E5}" srcOrd="0" destOrd="1" presId="urn:diagrams.loki3.com/BracketList"/>
-    <dgm:cxn modelId="{7EF461A3-B6F8-4F6B-97C8-92E09B57DE53}" type="presOf" srcId="{164E8698-AFAF-4CB2-B4F3-998C20BC454A}" destId="{398CB2CD-779C-49F2-8BFB-080731C053C4}" srcOrd="0" destOrd="1" presId="urn:diagrams.loki3.com/BracketList"/>
-    <dgm:cxn modelId="{28B56941-8F31-4021-B7DC-9157A97CAB48}" srcId="{91D0EB76-F6A9-4BEE-9D16-8DA43E52546D}" destId="{CB3DF28C-448D-4C63-9418-3265BDDDC3E1}" srcOrd="0" destOrd="0" parTransId="{EF261564-70E3-4D7D-BAD0-0E38770BC784}" sibTransId="{16A16E68-8BAF-48BA-8EF9-0ACC92334016}"/>
-    <dgm:cxn modelId="{8B9D6DA6-88A4-46E3-B80F-67F87100962C}" srcId="{C971C89A-9A94-4551-B102-2C432965F17D}" destId="{01CD7B7E-2963-42DD-830A-40869D9DC10D}" srcOrd="4" destOrd="0" parTransId="{728C3420-F075-49C5-9C10-56A81EC5A2DA}" sibTransId="{D9D951CE-8F4B-45EB-AAC7-F2007504AB0E}"/>
-    <dgm:cxn modelId="{DE528766-77B6-4C98-9EFD-CF2557B2D25E}" type="presOf" srcId="{C971C89A-9A94-4551-B102-2C432965F17D}" destId="{266E1F04-00A6-4F70-82C2-6885CB3891F7}" srcOrd="0" destOrd="0" presId="urn:diagrams.loki3.com/BracketList"/>
-    <dgm:cxn modelId="{49BF8DBC-311C-4FE8-BBC2-D02B4C2EF236}" type="presOf" srcId="{1C8E9815-AE6D-496D-A735-87CBA79964EA}" destId="{F81F2571-3068-41FC-9522-0E7D25B49BBE}" srcOrd="0" destOrd="0" presId="urn:diagrams.loki3.com/BracketList"/>
+    <dgm:cxn modelId="{9F4E86EB-E503-495A-8570-D3EB4BFF2EB3}" srcId="{C971C89A-9A94-4551-B102-2C432965F17D}" destId="{E61B1C18-0BF1-4FB5-AE84-A8D20D8BB814}" srcOrd="2" destOrd="0" parTransId="{0610FD21-E0ED-44BD-9308-C58FA25C3D1C}" sibTransId="{98A03895-C1BB-4195-864A-5486CCC34EE7}"/>
     <dgm:cxn modelId="{D7B3C4F9-4711-465D-BA3B-6205468BCBF6}" type="presOf" srcId="{E61B1C18-0BF1-4FB5-AE84-A8D20D8BB814}" destId="{D5568032-CC70-4A3C-83E4-B27849DED8D4}" srcOrd="0" destOrd="0" presId="urn:diagrams.loki3.com/BracketList"/>
-    <dgm:cxn modelId="{FFE7F458-A350-49FE-8616-0FAAE89D669C}" srcId="{01CD7B7E-2963-42DD-830A-40869D9DC10D}" destId="{0FF9AD06-06E8-47A0-A8CC-3EF3B3FDAFD2}" srcOrd="0" destOrd="0" parTransId="{79E0C327-A854-4DC8-96D3-56754D16A66F}" sibTransId="{1815DD62-97B8-40EF-AF59-D54F015E28A6}"/>
-    <dgm:cxn modelId="{FED6E513-1A96-4942-A65D-9B979C8CE41B}" srcId="{1C8E9815-AE6D-496D-A735-87CBA79964EA}" destId="{E345950A-B289-46B9-AE71-F4FD36752FD9}" srcOrd="1" destOrd="0" parTransId="{8EFD0B75-AD06-42B0-8D35-A60D79FC3BF7}" sibTransId="{8932E850-9A68-4570-B3E8-5822C7EFB70D}"/>
-    <dgm:cxn modelId="{E976EA01-693D-4291-8FB1-9F80923F866E}" type="presOf" srcId="{01CD7B7E-2963-42DD-830A-40869D9DC10D}" destId="{A9DDCD47-19B7-449F-8E6F-04A01F49980F}" srcOrd="0" destOrd="0" presId="urn:diagrams.loki3.com/BracketList"/>
-    <dgm:cxn modelId="{B933AAA6-4EA3-4B91-84B9-1AFAD70EC433}" srcId="{C971C89A-9A94-4551-B102-2C432965F17D}" destId="{1C8E9815-AE6D-496D-A735-87CBA79964EA}" srcOrd="0" destOrd="0" parTransId="{2B6CDF61-E902-4664-9F91-3305D63716E1}" sibTransId="{43B88CF8-B095-4A9C-8A37-279ACBC7ED3E}"/>
-    <dgm:cxn modelId="{CB2028BF-DA15-48AE-B400-7B0F43D50C81}" type="presOf" srcId="{CB3DF28C-448D-4C63-9418-3265BDDDC3E1}" destId="{B27D6E9B-39F6-404E-948D-C2CE04A7CAC1}" srcOrd="0" destOrd="0" presId="urn:diagrams.loki3.com/BracketList"/>
-    <dgm:cxn modelId="{EC32E268-B68C-429E-8164-FCADB9EADC5B}" srcId="{E61B1C18-0BF1-4FB5-AE84-A8D20D8BB814}" destId="{5CEA56EB-9454-4960-A990-EEF1533B300E}" srcOrd="0" destOrd="0" parTransId="{C2D1F64C-06B2-4804-BC75-DA5EB95D68EB}" sibTransId="{2D1C0280-F6B5-42F2-9343-2C16CF5DCAC2}"/>
-    <dgm:cxn modelId="{CAF582BC-D00C-4E5B-8618-DC5F1F7031E7}" srcId="{91D0EB76-F6A9-4BEE-9D16-8DA43E52546D}" destId="{9AD3CE5F-F11B-465C-A987-72C34871B54E}" srcOrd="1" destOrd="0" parTransId="{804E7FB5-C401-4418-BD63-DE1136CAC019}" sibTransId="{92FB8E84-AABD-4F83-AECE-E0CA5271C755}"/>
-    <dgm:cxn modelId="{9F4E86EB-E503-495A-8570-D3EB4BFF2EB3}" srcId="{C971C89A-9A94-4551-B102-2C432965F17D}" destId="{E61B1C18-0BF1-4FB5-AE84-A8D20D8BB814}" srcOrd="2" destOrd="0" parTransId="{0610FD21-E0ED-44BD-9308-C58FA25C3D1C}" sibTransId="{98A03895-C1BB-4195-864A-5486CCC34EE7}"/>
-    <dgm:cxn modelId="{DC6C456A-EC3A-469E-A292-A2023706545E}" type="presOf" srcId="{E345950A-B289-46B9-AE71-F4FD36752FD9}" destId="{02457115-F5E5-4F1A-BBCC-CDB7F5A10EC8}" srcOrd="0" destOrd="1" presId="urn:diagrams.loki3.com/BracketList"/>
-    <dgm:cxn modelId="{28C48724-9D0D-4163-AD36-EC7D92688DE6}" type="presOf" srcId="{AE3C2586-E145-40B9-A992-EAED99AEC4D6}" destId="{02457115-F5E5-4F1A-BBCC-CDB7F5A10EC8}" srcOrd="0" destOrd="0" presId="urn:diagrams.loki3.com/BracketList"/>
-    <dgm:cxn modelId="{D968835E-D4CA-421C-B246-1FBDABDE5F40}" srcId="{E61B1C18-0BF1-4FB5-AE84-A8D20D8BB814}" destId="{164E8698-AFAF-4CB2-B4F3-998C20BC454A}" srcOrd="1" destOrd="0" parTransId="{904320E9-9D4F-423E-BAC0-C2D12F01B24A}" sibTransId="{3400E59D-175C-40F7-B62D-25347A2DA855}"/>
-    <dgm:cxn modelId="{BBB78E14-4CAF-4AFA-B9F3-69B3DF38A133}" srcId="{C971C89A-9A94-4551-B102-2C432965F17D}" destId="{91D0EB76-F6A9-4BEE-9D16-8DA43E52546D}" srcOrd="1" destOrd="0" parTransId="{6286C36D-FC46-4524-9067-AAE5F84B8635}" sibTransId="{A92C918E-D55A-455B-B912-45E99CE43753}"/>
-    <dgm:cxn modelId="{ED749A21-A90F-48E6-8E0C-DF8719A99EA9}" type="presOf" srcId="{5CEA56EB-9454-4960-A990-EEF1533B300E}" destId="{398CB2CD-779C-49F2-8BFB-080731C053C4}" srcOrd="0" destOrd="0" presId="urn:diagrams.loki3.com/BracketList"/>
-    <dgm:cxn modelId="{8241C7D5-07FA-4C53-8075-D6E625712363}" type="presOf" srcId="{0C527BBD-610B-4C85-B280-A6F0A00C7A05}" destId="{427277C7-FC4F-4231-9C3F-920C3815A9E5}" srcOrd="0" destOrd="0" presId="urn:diagrams.loki3.com/BracketList"/>
-    <dgm:cxn modelId="{9207E6B2-EE00-481D-AC6F-80F1D5831275}" srcId="{01CD7B7E-2963-42DD-830A-40869D9DC10D}" destId="{D3EA8E8C-7AA2-44C3-827B-1021A79F427E}" srcOrd="1" destOrd="0" parTransId="{B1FAE5BF-6995-4641-85B2-9BB59C934C8A}" sibTransId="{7A5D70D5-B7D0-40A8-B427-07D00EE0BBDA}"/>
-    <dgm:cxn modelId="{2C4C9DC7-F204-4C99-828A-989C202C330E}" type="presOf" srcId="{9AD3CE5F-F11B-465C-A987-72C34871B54E}" destId="{B27D6E9B-39F6-404E-948D-C2CE04A7CAC1}" srcOrd="0" destOrd="1" presId="urn:diagrams.loki3.com/BracketList"/>
-    <dgm:cxn modelId="{E7D6EF1B-D7B0-46E6-B7BE-1373B8F8CE7C}" type="presOf" srcId="{0FF9AD06-06E8-47A0-A8CC-3EF3B3FDAFD2}" destId="{21498668-43E3-41E3-8FF6-C2B71F9AE46B}" srcOrd="0" destOrd="0" presId="urn:diagrams.loki3.com/BracketList"/>
-    <dgm:cxn modelId="{0879D504-44E8-40AD-AAB0-E707306A1F69}" type="presOf" srcId="{C06AC3F6-9C8A-4537-8716-7D1E01D69A22}" destId="{586EB7D3-FDA4-473A-9871-AA960A7336FD}" srcOrd="0" destOrd="0" presId="urn:diagrams.loki3.com/BracketList"/>
-    <dgm:cxn modelId="{FEA4FD7B-9DBD-4824-AC5A-4860C082D3F6}" type="presOf" srcId="{91D0EB76-F6A9-4BEE-9D16-8DA43E52546D}" destId="{3A077590-EFBB-40E2-B1A8-C4C700B019BE}" srcOrd="0" destOrd="0" presId="urn:diagrams.loki3.com/BracketList"/>
-    <dgm:cxn modelId="{0C0C895C-C7E4-4C74-B949-254A9ABAC2AF}" srcId="{C971C89A-9A94-4551-B102-2C432965F17D}" destId="{C06AC3F6-9C8A-4537-8716-7D1E01D69A22}" srcOrd="3" destOrd="0" parTransId="{3AB7139D-662E-4855-ACC5-260395550E37}" sibTransId="{1E7AD02D-7A32-41FD-A49C-79587D51E495}"/>
-    <dgm:cxn modelId="{5043171C-500F-43B2-9056-B2A2B61290EB}" type="presOf" srcId="{D3EA8E8C-7AA2-44C3-827B-1021A79F427E}" destId="{21498668-43E3-41E3-8FF6-C2B71F9AE46B}" srcOrd="0" destOrd="1" presId="urn:diagrams.loki3.com/BracketList"/>
-    <dgm:cxn modelId="{21408CD6-0B0A-41F3-B6A3-AFC2F14EA227}" srcId="{1C8E9815-AE6D-496D-A735-87CBA79964EA}" destId="{AE3C2586-E145-40B9-A992-EAED99AEC4D6}" srcOrd="0" destOrd="0" parTransId="{6BA9DE15-F13C-4A36-8C0A-03796FEDF8D9}" sibTransId="{E8BE0BCD-AE07-4AD9-9699-76C01CC669D7}"/>
     <dgm:cxn modelId="{33386158-F8B4-4596-A73F-6AEE1EFEB5BC}" type="presParOf" srcId="{266E1F04-00A6-4F70-82C2-6885CB3891F7}" destId="{3D951C67-6A73-4DEA-9DD2-D7153CFDFDEE}" srcOrd="0" destOrd="0" presId="urn:diagrams.loki3.com/BracketList"/>
     <dgm:cxn modelId="{87ECFC54-C11E-4F27-A7A5-CC427F325A21}" type="presParOf" srcId="{3D951C67-6A73-4DEA-9DD2-D7153CFDFDEE}" destId="{F81F2571-3068-41FC-9522-0E7D25B49BBE}" srcOrd="0" destOrd="0" presId="urn:diagrams.loki3.com/BracketList"/>
     <dgm:cxn modelId="{DDB6115A-867F-4751-839D-0C6F4AC7A277}" type="presParOf" srcId="{3D951C67-6A73-4DEA-9DD2-D7153CFDFDEE}" destId="{3B6DE39D-AA0F-49E9-98F3-259607EB6E8A}" srcOrd="1" destOrd="0" presId="urn:diagrams.loki3.com/BracketList"/>
@@ -5257,7 +5079,7 @@
         </a:bodyPr>
         <a:lstStyle/>
         <a:p>
-          <a:pPr lvl="0" algn="l" defTabSz="1333500">
+          <a:pPr marL="0" lvl="0" indent="0" algn="l" defTabSz="1333500">
             <a:lnSpc>
               <a:spcPct val="90000"/>
             </a:lnSpc>
@@ -5267,6 +5089,7 @@
             <a:spcAft>
               <a:spcPct val="35000"/>
             </a:spcAft>
+            <a:buNone/>
           </a:pPr>
           <a:r>
             <a:rPr lang="en-US" sz="3000" b="0" kern="1200" dirty="0">
@@ -5288,7 +5111,7 @@
             <a:spcAft>
               <a:spcPct val="15000"/>
             </a:spcAft>
-            <a:buChar char="••"/>
+            <a:buChar char="•"/>
           </a:pPr>
           <a:r>
             <a:rPr lang="en-US" sz="2300" kern="1200" dirty="0" err="1">
@@ -5315,7 +5138,7 @@
             <a:spcAft>
               <a:spcPct val="15000"/>
             </a:spcAft>
-            <a:buChar char="••"/>
+            <a:buChar char="•"/>
           </a:pPr>
           <a:r>
             <a:rPr lang="en-US" sz="2300" kern="1200" dirty="0">
@@ -5337,7 +5160,7 @@
             <a:spcAft>
               <a:spcPct val="15000"/>
             </a:spcAft>
-            <a:buChar char="••"/>
+            <a:buChar char="•"/>
           </a:pPr>
           <a:r>
             <a:rPr lang="en-US" sz="2300" kern="1200" dirty="0">
@@ -5371,7 +5194,7 @@
           <a:gsLst>
             <a:gs pos="0">
               <a:schemeClr val="accent5">
-                <a:hueOff val="2003566"/>
+                <a:hueOff val="2003568"/>
                 <a:satOff val="-8793"/>
                 <a:lumOff val="2614"/>
                 <a:alphaOff val="0"/>
@@ -5381,7 +5204,7 @@
             </a:gs>
             <a:gs pos="78000">
               <a:schemeClr val="accent5">
-                <a:hueOff val="2003566"/>
+                <a:hueOff val="2003568"/>
                 <a:satOff val="-8793"/>
                 <a:lumOff val="2614"/>
                 <a:alphaOff val="0"/>
@@ -5431,7 +5254,7 @@
         </a:bodyPr>
         <a:lstStyle/>
         <a:p>
-          <a:pPr lvl="0" algn="l" defTabSz="1333500">
+          <a:pPr marL="0" lvl="0" indent="0" algn="l" defTabSz="1333500">
             <a:lnSpc>
               <a:spcPct val="90000"/>
             </a:lnSpc>
@@ -5441,6 +5264,7 @@
             <a:spcAft>
               <a:spcPct val="35000"/>
             </a:spcAft>
+            <a:buNone/>
           </a:pPr>
           <a:r>
             <a:rPr lang="en-US" sz="3000" kern="1200" dirty="0">
@@ -5462,7 +5286,7 @@
             <a:spcAft>
               <a:spcPct val="15000"/>
             </a:spcAft>
-            <a:buChar char="••"/>
+            <a:buChar char="•"/>
           </a:pPr>
           <a:r>
             <a:rPr lang="en-US" sz="2300" kern="1200" dirty="0">
@@ -5484,7 +5308,7 @@
             <a:spcAft>
               <a:spcPct val="15000"/>
             </a:spcAft>
-            <a:buChar char="••"/>
+            <a:buChar char="•"/>
           </a:pPr>
           <a:r>
             <a:rPr lang="en-US" sz="2300" kern="1200" dirty="0">
@@ -5518,7 +5342,7 @@
           <a:gsLst>
             <a:gs pos="0">
               <a:schemeClr val="accent5">
-                <a:hueOff val="4007133"/>
+                <a:hueOff val="4007135"/>
                 <a:satOff val="-17587"/>
                 <a:lumOff val="5229"/>
                 <a:alphaOff val="0"/>
@@ -5528,7 +5352,7 @@
             </a:gs>
             <a:gs pos="78000">
               <a:schemeClr val="accent5">
-                <a:hueOff val="4007133"/>
+                <a:hueOff val="4007135"/>
                 <a:satOff val="-17587"/>
                 <a:lumOff val="5229"/>
                 <a:alphaOff val="0"/>
@@ -5578,7 +5402,7 @@
         </a:bodyPr>
         <a:lstStyle/>
         <a:p>
-          <a:pPr lvl="0" algn="l" defTabSz="1333500">
+          <a:pPr marL="0" lvl="0" indent="0" algn="l" defTabSz="1333500">
             <a:lnSpc>
               <a:spcPct val="90000"/>
             </a:lnSpc>
@@ -5588,6 +5412,7 @@
             <a:spcAft>
               <a:spcPct val="35000"/>
             </a:spcAft>
+            <a:buNone/>
           </a:pPr>
           <a:r>
             <a:rPr lang="en-US" sz="3000" kern="1200" dirty="0" err="1">
@@ -5614,7 +5439,7 @@
             <a:spcAft>
               <a:spcPct val="15000"/>
             </a:spcAft>
-            <a:buChar char="••"/>
+            <a:buChar char="•"/>
           </a:pPr>
           <a:r>
             <a:rPr lang="en-US" sz="2300" kern="1200" dirty="0">
@@ -5648,7 +5473,7 @@
           <a:gsLst>
             <a:gs pos="0">
               <a:schemeClr val="accent5">
-                <a:hueOff val="6010699"/>
+                <a:hueOff val="6010703"/>
                 <a:satOff val="-26380"/>
                 <a:lumOff val="7843"/>
                 <a:alphaOff val="0"/>
@@ -5658,7 +5483,7 @@
             </a:gs>
             <a:gs pos="78000">
               <a:schemeClr val="accent5">
-                <a:hueOff val="6010699"/>
+                <a:hueOff val="6010703"/>
                 <a:satOff val="-26380"/>
                 <a:lumOff val="7843"/>
                 <a:alphaOff val="0"/>
@@ -5708,7 +5533,7 @@
         </a:bodyPr>
         <a:lstStyle/>
         <a:p>
-          <a:pPr lvl="0" algn="l" defTabSz="1333500">
+          <a:pPr marL="0" lvl="0" indent="0" algn="l" defTabSz="1333500">
             <a:lnSpc>
               <a:spcPct val="90000"/>
             </a:lnSpc>
@@ -5718,6 +5543,7 @@
             <a:spcAft>
               <a:spcPct val="35000"/>
             </a:spcAft>
+            <a:buNone/>
           </a:pPr>
           <a:r>
             <a:rPr lang="en-US" sz="3000" kern="1200" dirty="0">
@@ -5739,7 +5565,7 @@
             <a:spcAft>
               <a:spcPct val="15000"/>
             </a:spcAft>
-            <a:buChar char="••"/>
+            <a:buChar char="•"/>
           </a:pPr>
           <a:r>
             <a:rPr lang="en-US" sz="2300" kern="1200" dirty="0">
@@ -5761,7 +5587,7 @@
             <a:spcAft>
               <a:spcPct val="15000"/>
             </a:spcAft>
-            <a:buChar char="••"/>
+            <a:buChar char="•"/>
           </a:pPr>
           <a:r>
             <a:rPr lang="en-US" sz="2300" kern="1200" dirty="0">
@@ -5856,7 +5682,7 @@
             <a:spcAft>
               <a:spcPct val="15000"/>
             </a:spcAft>
-            <a:buChar char="••"/>
+            <a:buChar char="•"/>
           </a:pPr>
           <a:r>
             <a:rPr lang="en-US" sz="1700" kern="1200" dirty="0"/>
@@ -5874,7 +5700,7 @@
             <a:spcAft>
               <a:spcPct val="15000"/>
             </a:spcAft>
-            <a:buChar char="••"/>
+            <a:buChar char="•"/>
           </a:pPr>
           <a:r>
             <a:rPr lang="en-US" sz="1700" kern="1200" dirty="0"/>
@@ -5941,7 +5767,7 @@
         </a:bodyPr>
         <a:lstStyle/>
         <a:p>
-          <a:pPr lvl="0" algn="ctr" defTabSz="1022350">
+          <a:pPr marL="0" lvl="0" indent="0" algn="ctr" defTabSz="1022350">
             <a:lnSpc>
               <a:spcPct val="90000"/>
             </a:lnSpc>
@@ -5951,6 +5777,7 @@
             <a:spcAft>
               <a:spcPct val="35000"/>
             </a:spcAft>
+            <a:buNone/>
           </a:pPr>
           <a:r>
             <a:rPr lang="en-GB" sz="2300" kern="1200" dirty="0" err="1">
@@ -6062,7 +5889,7 @@
             <a:spcAft>
               <a:spcPct val="15000"/>
             </a:spcAft>
-            <a:buChar char="••"/>
+            <a:buChar char="•"/>
           </a:pPr>
           <a:r>
             <a:rPr lang="en-US" sz="1700" kern="1200" dirty="0"/>
@@ -6080,7 +5907,7 @@
             <a:spcAft>
               <a:spcPct val="15000"/>
             </a:spcAft>
-            <a:buChar char="••"/>
+            <a:buChar char="•"/>
           </a:pPr>
           <a:r>
             <a:rPr lang="en-US" sz="1700" kern="1200" dirty="0"/>
@@ -6147,7 +5974,7 @@
         </a:bodyPr>
         <a:lstStyle/>
         <a:p>
-          <a:pPr lvl="0" algn="ctr" defTabSz="1022350">
+          <a:pPr marL="0" lvl="0" indent="0" algn="ctr" defTabSz="1022350">
             <a:lnSpc>
               <a:spcPct val="90000"/>
             </a:lnSpc>
@@ -6157,6 +5984,7 @@
             <a:spcAft>
               <a:spcPct val="35000"/>
             </a:spcAft>
+            <a:buNone/>
           </a:pPr>
           <a:r>
             <a:rPr lang="en-GB" sz="2300" kern="1200" dirty="0">
@@ -6260,7 +6088,7 @@
             <a:spcAft>
               <a:spcPct val="15000"/>
             </a:spcAft>
-            <a:buChar char="••"/>
+            <a:buChar char="•"/>
           </a:pPr>
           <a:r>
             <a:rPr lang="en-US" sz="1700" kern="1200" dirty="0"/>
@@ -6278,7 +6106,7 @@
             <a:spcAft>
               <a:spcPct val="15000"/>
             </a:spcAft>
-            <a:buChar char="••"/>
+            <a:buChar char="•"/>
           </a:pPr>
           <a:r>
             <a:rPr lang="en-US" sz="1700" kern="1200" dirty="0"/>
@@ -6345,7 +6173,7 @@
         </a:bodyPr>
         <a:lstStyle/>
         <a:p>
-          <a:pPr lvl="0" algn="ctr" defTabSz="1022350">
+          <a:pPr marL="0" lvl="0" indent="0" algn="ctr" defTabSz="1022350">
             <a:lnSpc>
               <a:spcPct val="90000"/>
             </a:lnSpc>
@@ -6355,6 +6183,7 @@
             <a:spcAft>
               <a:spcPct val="35000"/>
             </a:spcAft>
+            <a:buNone/>
           </a:pPr>
           <a:r>
             <a:rPr lang="en-GB" sz="2300" kern="1200" dirty="0">
@@ -6450,7 +6279,7 @@
             <a:spcAft>
               <a:spcPct val="15000"/>
             </a:spcAft>
-            <a:buChar char="••"/>
+            <a:buChar char="•"/>
           </a:pPr>
           <a:r>
             <a:rPr lang="en-US" sz="1700" kern="1200" dirty="0"/>
@@ -6468,7 +6297,7 @@
             <a:spcAft>
               <a:spcPct val="15000"/>
             </a:spcAft>
-            <a:buChar char="••"/>
+            <a:buChar char="•"/>
           </a:pPr>
           <a:r>
             <a:rPr lang="en-US" sz="1700" kern="1200" dirty="0"/>
@@ -6535,7 +6364,7 @@
         </a:bodyPr>
         <a:lstStyle/>
         <a:p>
-          <a:pPr lvl="0" algn="ctr" defTabSz="1022350">
+          <a:pPr marL="0" lvl="0" indent="0" algn="ctr" defTabSz="1022350">
             <a:lnSpc>
               <a:spcPct val="90000"/>
             </a:lnSpc>
@@ -6545,6 +6374,7 @@
             <a:spcAft>
               <a:spcPct val="35000"/>
             </a:spcAft>
+            <a:buNone/>
           </a:pPr>
           <a:r>
             <a:rPr lang="en-GB" sz="2300" kern="1200" dirty="0" err="1">
@@ -6640,7 +6470,7 @@
             <a:spcAft>
               <a:spcPct val="15000"/>
             </a:spcAft>
-            <a:buChar char="••"/>
+            <a:buChar char="•"/>
           </a:pPr>
           <a:r>
             <a:rPr lang="en-US" sz="1700" kern="1200" dirty="0"/>
@@ -6658,7 +6488,7 @@
             <a:spcAft>
               <a:spcPct val="15000"/>
             </a:spcAft>
-            <a:buChar char="••"/>
+            <a:buChar char="•"/>
           </a:pPr>
           <a:r>
             <a:rPr lang="en-US" sz="1700" kern="1200" dirty="0"/>
@@ -6725,7 +6555,7 @@
         </a:bodyPr>
         <a:lstStyle/>
         <a:p>
-          <a:pPr lvl="0" algn="ctr" defTabSz="1022350">
+          <a:pPr marL="0" lvl="0" indent="0" algn="ctr" defTabSz="1022350">
             <a:lnSpc>
               <a:spcPct val="90000"/>
             </a:lnSpc>
@@ -6735,6 +6565,7 @@
             <a:spcAft>
               <a:spcPct val="35000"/>
             </a:spcAft>
+            <a:buNone/>
           </a:pPr>
           <a:r>
             <a:rPr lang="en-GB" sz="2300" kern="1200" dirty="0" err="1">
@@ -6821,7 +6652,7 @@
         </a:bodyPr>
         <a:lstStyle/>
         <a:p>
-          <a:pPr lvl="0" algn="r" defTabSz="1066800">
+          <a:pPr marL="0" lvl="0" indent="0" algn="r" defTabSz="1066800">
             <a:lnSpc>
               <a:spcPct val="90000"/>
             </a:lnSpc>
@@ -6831,6 +6662,7 @@
             <a:spcAft>
               <a:spcPct val="35000"/>
             </a:spcAft>
+            <a:buNone/>
           </a:pPr>
           <a:r>
             <a:rPr lang="en-GB" sz="2400" kern="1200" dirty="0" err="1">
@@ -6973,7 +6805,7 @@
             <a:spcAft>
               <a:spcPct val="15000"/>
             </a:spcAft>
-            <a:buChar char="••"/>
+            <a:buChar char="•"/>
           </a:pPr>
           <a:r>
             <a:rPr lang="en-US" sz="2400" kern="1200" dirty="0"/>
@@ -6991,7 +6823,7 @@
             <a:spcAft>
               <a:spcPct val="15000"/>
             </a:spcAft>
-            <a:buChar char="••"/>
+            <a:buChar char="•"/>
           </a:pPr>
           <a:r>
             <a:rPr lang="en-US" sz="2400" kern="1200" dirty="0"/>
@@ -7041,7 +6873,7 @@
         </a:bodyPr>
         <a:lstStyle/>
         <a:p>
-          <a:pPr lvl="0" algn="r" defTabSz="1066800">
+          <a:pPr marL="0" lvl="0" indent="0" algn="r" defTabSz="1066800">
             <a:lnSpc>
               <a:spcPct val="90000"/>
             </a:lnSpc>
@@ -7051,6 +6883,7 @@
             <a:spcAft>
               <a:spcPct val="35000"/>
             </a:spcAft>
+            <a:buNone/>
           </a:pPr>
           <a:r>
             <a:rPr lang="en-GB" sz="2400" kern="1200" dirty="0">
@@ -7193,7 +7026,7 @@
             <a:spcAft>
               <a:spcPct val="15000"/>
             </a:spcAft>
-            <a:buChar char="••"/>
+            <a:buChar char="•"/>
           </a:pPr>
           <a:r>
             <a:rPr lang="en-US" sz="2400" kern="1200" dirty="0"/>
@@ -7211,7 +7044,7 @@
             <a:spcAft>
               <a:spcPct val="15000"/>
             </a:spcAft>
-            <a:buChar char="••"/>
+            <a:buChar char="•"/>
           </a:pPr>
           <a:r>
             <a:rPr lang="en-US" sz="2400" kern="1200" dirty="0"/>
@@ -7261,7 +7094,7 @@
         </a:bodyPr>
         <a:lstStyle/>
         <a:p>
-          <a:pPr lvl="0" algn="r" defTabSz="1066800">
+          <a:pPr marL="0" lvl="0" indent="0" algn="r" defTabSz="1066800">
             <a:lnSpc>
               <a:spcPct val="90000"/>
             </a:lnSpc>
@@ -7271,6 +7104,7 @@
             <a:spcAft>
               <a:spcPct val="35000"/>
             </a:spcAft>
+            <a:buNone/>
           </a:pPr>
           <a:r>
             <a:rPr lang="en-GB" sz="2400" kern="1200" dirty="0">
@@ -7405,7 +7239,7 @@
             <a:spcAft>
               <a:spcPct val="15000"/>
             </a:spcAft>
-            <a:buChar char="••"/>
+            <a:buChar char="•"/>
           </a:pPr>
           <a:r>
             <a:rPr lang="en-US" sz="2400" kern="1200" dirty="0"/>
@@ -7423,7 +7257,7 @@
             <a:spcAft>
               <a:spcPct val="15000"/>
             </a:spcAft>
-            <a:buChar char="••"/>
+            <a:buChar char="•"/>
           </a:pPr>
           <a:r>
             <a:rPr lang="en-US" sz="2400" kern="1200" dirty="0"/>
@@ -7473,7 +7307,7 @@
         </a:bodyPr>
         <a:lstStyle/>
         <a:p>
-          <a:pPr lvl="0" algn="r" defTabSz="1066800">
+          <a:pPr marL="0" lvl="0" indent="0" algn="r" defTabSz="1066800">
             <a:lnSpc>
               <a:spcPct val="90000"/>
             </a:lnSpc>
@@ -7483,6 +7317,7 @@
             <a:spcAft>
               <a:spcPct val="35000"/>
             </a:spcAft>
+            <a:buNone/>
           </a:pPr>
           <a:r>
             <a:rPr lang="en-GB" sz="2400" kern="1200" dirty="0" err="1">
@@ -7617,7 +7452,7 @@
             <a:spcAft>
               <a:spcPct val="15000"/>
             </a:spcAft>
-            <a:buChar char="••"/>
+            <a:buChar char="•"/>
           </a:pPr>
           <a:r>
             <a:rPr lang="en-US" sz="2400" kern="1200" dirty="0"/>
@@ -7635,7 +7470,7 @@
             <a:spcAft>
               <a:spcPct val="15000"/>
             </a:spcAft>
-            <a:buChar char="••"/>
+            <a:buChar char="•"/>
           </a:pPr>
           <a:r>
             <a:rPr lang="en-US" sz="2400" kern="1200" dirty="0"/>
@@ -7685,7 +7520,7 @@
         </a:bodyPr>
         <a:lstStyle/>
         <a:p>
-          <a:pPr lvl="0" algn="r" defTabSz="1066800">
+          <a:pPr marL="0" lvl="0" indent="0" algn="r" defTabSz="1066800">
             <a:lnSpc>
               <a:spcPct val="90000"/>
             </a:lnSpc>
@@ -7695,6 +7530,7 @@
             <a:spcAft>
               <a:spcPct val="35000"/>
             </a:spcAft>
+            <a:buNone/>
           </a:pPr>
           <a:r>
             <a:rPr lang="en-GB" sz="2400" kern="1200" dirty="0" err="1">
@@ -7837,7 +7673,7 @@
             <a:spcAft>
               <a:spcPct val="15000"/>
             </a:spcAft>
-            <a:buChar char="••"/>
+            <a:buChar char="•"/>
           </a:pPr>
           <a:r>
             <a:rPr lang="en-US" sz="2400" kern="1200" dirty="0"/>
@@ -7855,7 +7691,7 @@
             <a:spcAft>
               <a:spcPct val="15000"/>
             </a:spcAft>
-            <a:buChar char="••"/>
+            <a:buChar char="•"/>
           </a:pPr>
           <a:r>
             <a:rPr lang="en-US" sz="2400" kern="1200" dirty="0"/>
@@ -17508,7 +17344,7 @@
           <p:nvPr>
             <p:extLst>
               <p:ext uri="{386F3935-93C4-4BCD-93E2-E3B085C9AB24}">
-                <p16:designElem xmlns:p16="http://schemas.microsoft.com/office/powerpoint/2015/main" xmlns="" val="1"/>
+                <p16:designElem xmlns:p16="http://schemas.microsoft.com/office/powerpoint/2015/main" val="1"/>
               </p:ext>
             </p:extLst>
           </p:nvPr>
@@ -17553,7 +17389,7 @@
           <p:nvPr>
             <p:extLst>
               <p:ext uri="{386F3935-93C4-4BCD-93E2-E3B085C9AB24}">
-                <p16:designElem xmlns:p16="http://schemas.microsoft.com/office/powerpoint/2015/main" xmlns="" val="1"/>
+                <p16:designElem xmlns:p16="http://schemas.microsoft.com/office/powerpoint/2015/main" val="1"/>
               </p:ext>
             </p:extLst>
           </p:nvPr>
@@ -17598,7 +17434,7 @@
           <p:nvPr>
             <p:extLst>
               <p:ext uri="{386F3935-93C4-4BCD-93E2-E3B085C9AB24}">
-                <p16:designElem xmlns:p16="http://schemas.microsoft.com/office/powerpoint/2015/main" xmlns="" val="1"/>
+                <p16:designElem xmlns:p16="http://schemas.microsoft.com/office/powerpoint/2015/main" val="1"/>
               </p:ext>
             </p:extLst>
           </p:nvPr>
@@ -17669,7 +17505,7 @@
           <p:nvPr>
             <p:extLst>
               <p:ext uri="{386F3935-93C4-4BCD-93E2-E3B085C9AB24}">
-                <p16:designElem xmlns:p16="http://schemas.microsoft.com/office/powerpoint/2015/main" xmlns="" val="1"/>
+                <p16:designElem xmlns:p16="http://schemas.microsoft.com/office/powerpoint/2015/main" val="1"/>
               </p:ext>
             </p:extLst>
           </p:nvPr>
@@ -17740,7 +17576,7 @@
           <p:nvPr>
             <p:extLst>
               <p:ext uri="{386F3935-93C4-4BCD-93E2-E3B085C9AB24}">
-                <p16:designElem xmlns:p16="http://schemas.microsoft.com/office/powerpoint/2015/main" xmlns="" val="1"/>
+                <p16:designElem xmlns:p16="http://schemas.microsoft.com/office/powerpoint/2015/main" val="1"/>
               </p:ext>
             </p:extLst>
           </p:nvPr>
@@ -17789,7 +17625,7 @@
           <p:nvPr>
             <p:extLst>
               <p:ext uri="{386F3935-93C4-4BCD-93E2-E3B085C9AB24}">
-                <p16:designElem xmlns:p16="http://schemas.microsoft.com/office/powerpoint/2015/main" xmlns="" val="1"/>
+                <p16:designElem xmlns:p16="http://schemas.microsoft.com/office/powerpoint/2015/main" val="1"/>
               </p:ext>
             </p:extLst>
           </p:nvPr>
@@ -17861,7 +17697,7 @@
           <p:nvPr>
             <p:extLst>
               <p:ext uri="{386F3935-93C4-4BCD-93E2-E3B085C9AB24}">
-                <p16:designElem xmlns:p16="http://schemas.microsoft.com/office/powerpoint/2015/main" xmlns="" val="1"/>
+                <p16:designElem xmlns:p16="http://schemas.microsoft.com/office/powerpoint/2015/main" val="1"/>
               </p:ext>
             </p:extLst>
           </p:nvPr>
@@ -17934,7 +17770,7 @@
           <p:nvPr>
             <p:extLst>
               <p:ext uri="{386F3935-93C4-4BCD-93E2-E3B085C9AB24}">
-                <p16:designElem xmlns:p16="http://schemas.microsoft.com/office/powerpoint/2015/main" xmlns="" val="1"/>
+                <p16:designElem xmlns:p16="http://schemas.microsoft.com/office/powerpoint/2015/main" val="1"/>
               </p:ext>
             </p:extLst>
           </p:nvPr>
@@ -18005,7 +17841,7 @@
           <p:nvPr>
             <p:extLst>
               <p:ext uri="{386F3935-93C4-4BCD-93E2-E3B085C9AB24}">
-                <p16:designElem xmlns:p16="http://schemas.microsoft.com/office/powerpoint/2015/main" xmlns="" val="1"/>
+                <p16:designElem xmlns:p16="http://schemas.microsoft.com/office/powerpoint/2015/main" val="1"/>
               </p:ext>
             </p:extLst>
           </p:nvPr>
@@ -18158,39 +17994,7 @@
                   <a:schemeClr val="tx1"/>
                 </a:solidFill>
               </a:rPr>
-              <a:t>, Viktor </a:t>
-            </a:r>
-            <a:r>
-              <a:rPr lang="en-GB" sz="1600" dirty="0" err="1">
-                <a:solidFill>
-                  <a:schemeClr val="tx1"/>
-                </a:solidFill>
-              </a:rPr>
-              <a:t>Taskov</a:t>
-            </a:r>
-            <a:r>
-              <a:rPr lang="en-GB" sz="1600" dirty="0">
-                <a:solidFill>
-                  <a:schemeClr val="tx1"/>
-                </a:solidFill>
-              </a:rPr>
               <a:t>, </a:t>
-            </a:r>
-            <a:r>
-              <a:rPr lang="en-GB" sz="1600" dirty="0" err="1">
-                <a:solidFill>
-                  <a:schemeClr val="tx1"/>
-                </a:solidFill>
-              </a:rPr>
-              <a:t>Petar</a:t>
-            </a:r>
-            <a:r>
-              <a:rPr lang="en-GB" sz="1600" dirty="0">
-                <a:solidFill>
-                  <a:schemeClr val="tx1"/>
-                </a:solidFill>
-              </a:rPr>
-              <a:t> Petrov, </a:t>
             </a:r>
             <a:r>
               <a:rPr lang="en-GB" sz="1600" dirty="0" err="1">
@@ -18216,14 +18020,43 @@
               </a:rPr>
               <a:t>Panfilovs</a:t>
             </a:r>
+            <a:r>
+              <a:rPr lang="en-GB" sz="1600" dirty="0">
+                <a:solidFill>
+                  <a:schemeClr val="tx1"/>
+                </a:solidFill>
+              </a:rPr>
+              <a:t>, </a:t>
+            </a:r>
+            <a:r>
+              <a:rPr lang="en-GB" sz="1600" dirty="0" err="1">
+                <a:solidFill>
+                  <a:schemeClr val="tx1"/>
+                </a:solidFill>
+              </a:rPr>
+              <a:t>Petar</a:t>
+            </a:r>
+            <a:r>
+              <a:rPr lang="en-GB" sz="1600" dirty="0">
+                <a:solidFill>
+                  <a:schemeClr val="tx1"/>
+                </a:solidFill>
+              </a:rPr>
+              <a:t> Petrov, Viktor </a:t>
+            </a:r>
+            <a:r>
+              <a:rPr lang="en-GB" sz="1600" dirty="0" err="1">
+                <a:solidFill>
+                  <a:schemeClr val="tx1"/>
+                </a:solidFill>
+              </a:rPr>
+              <a:t>Taskov</a:t>
+            </a:r>
             <a:endParaRPr lang="en-GB" sz="1600" dirty="0">
               <a:solidFill>
                 <a:schemeClr val="tx1"/>
               </a:solidFill>
             </a:endParaRPr>
-          </a:p>
-          <a:p>
-            <a:endParaRPr lang="en-GB" sz="1600" dirty="0"/>
           </a:p>
         </p:txBody>
       </p:sp>
@@ -18398,11 +18231,6 @@
               </a:rPr>
               <a:t>The best players ever are shown off on the scoreboard. Do you have the guts to be one of them?</a:t>
             </a:r>
-            <a:endParaRPr lang="bg-BG" dirty="0">
-              <a:solidFill>
-                <a:schemeClr val="tx1"/>
-              </a:solidFill>
-            </a:endParaRPr>
           </a:p>
         </p:txBody>
       </p:sp>
@@ -18479,7 +18307,7 @@
                   <a:schemeClr val="tx1"/>
                 </a:solidFill>
               </a:rPr>
-              <a:t>Merging conflicts?</a:t>
+              <a:t>We often had merge conflicts in the team, when working on the same files, better communication and a more proficient use of Git would resolve this.</a:t>
             </a:r>
           </a:p>
           <a:p>
@@ -18489,23 +18317,7 @@
                   <a:schemeClr val="tx1"/>
                 </a:solidFill>
               </a:rPr>
-              <a:t>Model changes (had to change </a:t>
-            </a:r>
-            <a:r>
-              <a:rPr lang="en-GB" dirty="0" err="1">
-                <a:solidFill>
-                  <a:schemeClr val="tx1"/>
-                </a:solidFill>
-              </a:rPr>
-              <a:t>er</a:t>
-            </a:r>
-            <a:r>
-              <a:rPr lang="en-GB" dirty="0">
-                <a:solidFill>
-                  <a:schemeClr val="tx1"/>
-                </a:solidFill>
-              </a:rPr>
-              <a:t> diagram)</a:t>
+              <a:t>We had to change the database schema </a:t>
             </a:r>
           </a:p>
         </p:txBody>
@@ -19411,7 +19223,7 @@
   <a:extraClrSchemeLst/>
   <a:extLst>
     <a:ext uri="{05A4C25C-085E-4340-85A3-A5531E510DB2}">
-      <thm15:themeFamily xmlns:thm15="http://schemas.microsoft.com/office/thememl/2012/main" xmlns="" name="Facet" id="{C0C680CD-088A-49FC-A102-D699147F32B2}" vid="{CFBC31BA-B70F-4F30-BCAA-4F3011E16C4D}"/>
+      <thm15:themeFamily xmlns:thm15="http://schemas.microsoft.com/office/thememl/2012/main" name="Facet" id="{C0C680CD-088A-49FC-A102-D699147F32B2}" vid="{CFBC31BA-B70F-4F30-BCAA-4F3011E16C4D}"/>
     </a:ext>
   </a:extLst>
 </a:theme>

</xml_diff>